<commit_message>
add financial analysis deck
</commit_message>
<xml_diff>
--- a/Slide_Template/TSLA Financial deck.pptx
+++ b/Slide_Template/TSLA Financial deck.pptx
@@ -5,12 +5,15 @@
     <p:sldMasterId id="2147483648" r:id="rId1"/>
   </p:sldMasterIdLst>
   <p:notesMasterIdLst>
-    <p:notesMasterId r:id="rId5"/>
+    <p:notesMasterId r:id="rId8"/>
   </p:notesMasterIdLst>
   <p:sldIdLst>
     <p:sldId id="3838" r:id="rId2"/>
     <p:sldId id="3847" r:id="rId3"/>
-    <p:sldId id="3848" r:id="rId4"/>
+    <p:sldId id="3850" r:id="rId4"/>
+    <p:sldId id="3848" r:id="rId5"/>
+    <p:sldId id="3852" r:id="rId6"/>
+    <p:sldId id="3849" r:id="rId7"/>
   </p:sldIdLst>
   <p:sldSz cx="12192000" cy="6858000"/>
   <p:notesSz cx="6799263" cy="9929813"/>
@@ -754,7 +757,642 @@
     </p:spTree>
     <p:extLst>
       <p:ext uri="{BB962C8B-B14F-4D97-AF65-F5344CB8AC3E}">
+        <p14:creationId xmlns:p14="http://schemas.microsoft.com/office/powerpoint/2010/main" val="3175698224"/>
+      </p:ext>
+    </p:extLst>
+  </p:cSld>
+  <p:clrMapOvr>
+    <a:masterClrMapping/>
+  </p:clrMapOvr>
+</p:notes>
+</file>
+
+<file path=ppt/notesSlides/notesSlide4.xml><?xml version="1.0" encoding="utf-8"?>
+<p:notes xmlns:a="http://schemas.openxmlformats.org/drawingml/2006/main" xmlns:r="http://schemas.openxmlformats.org/officeDocument/2006/relationships" xmlns:p="http://schemas.openxmlformats.org/presentationml/2006/main">
+  <p:cSld>
+    <p:spTree>
+      <p:nvGrpSpPr>
+        <p:cNvPr id="1" name=""/>
+        <p:cNvGrpSpPr/>
+        <p:nvPr/>
+      </p:nvGrpSpPr>
+      <p:grpSpPr>
+        <a:xfrm>
+          <a:off x="0" y="0"/>
+          <a:ext cx="0" cy="0"/>
+          <a:chOff x="0" y="0"/>
+          <a:chExt cx="0" cy="0"/>
+        </a:xfrm>
+      </p:grpSpPr>
+      <p:sp>
+        <p:nvSpPr>
+          <p:cNvPr id="2" name="投影片影像版面配置區 1"/>
+          <p:cNvSpPr>
+            <a:spLocks noGrp="1" noRot="1" noChangeAspect="1"/>
+          </p:cNvSpPr>
+          <p:nvPr>
+            <p:ph type="sldImg"/>
+          </p:nvPr>
+        </p:nvSpPr>
+        <p:spPr/>
+      </p:sp>
+      <p:sp>
+        <p:nvSpPr>
+          <p:cNvPr id="3" name="備忘稿版面配置區 2"/>
+          <p:cNvSpPr>
+            <a:spLocks noGrp="1"/>
+          </p:cNvSpPr>
+          <p:nvPr>
+            <p:ph type="body" idx="1"/>
+          </p:nvPr>
+        </p:nvSpPr>
+        <p:spPr/>
+        <p:txBody>
+          <a:bodyPr/>
+          <a:lstStyle/>
+          <a:p>
+            <a:pPr marL="0" marR="0" lvl="0" indent="0" algn="l" defTabSz="914400" rtl="0" eaLnBrk="1" fontAlgn="auto" latinLnBrk="0" hangingPunct="1">
+              <a:lnSpc>
+                <a:spcPct val="100000"/>
+              </a:lnSpc>
+              <a:spcBef>
+                <a:spcPts val="0"/>
+              </a:spcBef>
+              <a:spcAft>
+                <a:spcPts val="0"/>
+              </a:spcAft>
+              <a:buClrTx/>
+              <a:buSzTx/>
+              <a:buFontTx/>
+              <a:buNone/>
+              <a:tabLst/>
+              <a:defRPr/>
+            </a:pPr>
+            <a:r>
+              <a:rPr lang="en-CA" dirty="0"/>
+              <a:t>General Motors Company  	 </a:t>
+            </a:r>
+          </a:p>
+          <a:p>
+            <a:pPr marL="0" marR="0" lvl="0" indent="0" algn="l" defTabSz="914400" rtl="0" eaLnBrk="1" fontAlgn="auto" latinLnBrk="0" hangingPunct="1">
+              <a:lnSpc>
+                <a:spcPct val="100000"/>
+              </a:lnSpc>
+              <a:spcBef>
+                <a:spcPts val="0"/>
+              </a:spcBef>
+              <a:spcAft>
+                <a:spcPts val="0"/>
+              </a:spcAft>
+              <a:buClrTx/>
+              <a:buSzTx/>
+              <a:buFontTx/>
+              <a:buNone/>
+              <a:tabLst/>
+              <a:defRPr/>
+            </a:pPr>
+            <a:r>
+              <a:rPr lang="en-CA" dirty="0"/>
+              <a:t> Ford Motor Company  	 </a:t>
+            </a:r>
+          </a:p>
+          <a:p>
+            <a:pPr marL="0" marR="0" lvl="0" indent="0" algn="l" defTabSz="914400" rtl="0" eaLnBrk="1" fontAlgn="auto" latinLnBrk="0" hangingPunct="1">
+              <a:lnSpc>
+                <a:spcPct val="100000"/>
+              </a:lnSpc>
+              <a:spcBef>
+                <a:spcPts val="0"/>
+              </a:spcBef>
+              <a:spcAft>
+                <a:spcPts val="0"/>
+              </a:spcAft>
+              <a:buClrTx/>
+              <a:buSzTx/>
+              <a:buFontTx/>
+              <a:buNone/>
+              <a:tabLst/>
+              <a:defRPr/>
+            </a:pPr>
+            <a:r>
+              <a:rPr lang="en-CA" dirty="0"/>
+              <a:t> BAIC Motor Corporation Limited  </a:t>
+            </a:r>
+          </a:p>
+          <a:p>
+            <a:pPr marL="0" marR="0" lvl="0" indent="0" algn="l" defTabSz="914400" rtl="0" eaLnBrk="1" fontAlgn="auto" latinLnBrk="0" hangingPunct="1">
+              <a:lnSpc>
+                <a:spcPct val="100000"/>
+              </a:lnSpc>
+              <a:spcBef>
+                <a:spcPts val="0"/>
+              </a:spcBef>
+              <a:spcAft>
+                <a:spcPts val="0"/>
+              </a:spcAft>
+              <a:buClrTx/>
+              <a:buSzTx/>
+              <a:buFontTx/>
+              <a:buNone/>
+              <a:tabLst/>
+              <a:defRPr/>
+            </a:pPr>
+            <a:r>
+              <a:rPr lang="en-CA" dirty="0"/>
+              <a:t>Aptiv PLC </a:t>
+            </a:r>
+          </a:p>
+          <a:p>
+            <a:pPr marL="0" marR="0" lvl="0" indent="0" algn="l" defTabSz="914400" rtl="0" eaLnBrk="1" fontAlgn="auto" latinLnBrk="0" hangingPunct="1">
+              <a:lnSpc>
+                <a:spcPct val="100000"/>
+              </a:lnSpc>
+              <a:spcBef>
+                <a:spcPts val="0"/>
+              </a:spcBef>
+              <a:spcAft>
+                <a:spcPts val="0"/>
+              </a:spcAft>
+              <a:buClrTx/>
+              <a:buSzTx/>
+              <a:buFontTx/>
+              <a:buNone/>
+              <a:tabLst/>
+              <a:defRPr/>
+            </a:pPr>
+            <a:r>
+              <a:rPr lang="en-CA" dirty="0"/>
+              <a:t>BYD Company Limited  </a:t>
+            </a:r>
+          </a:p>
+          <a:p>
+            <a:pPr marL="0" marR="0" lvl="0" indent="0" algn="l" defTabSz="914400" rtl="0" eaLnBrk="1" fontAlgn="auto" latinLnBrk="0" hangingPunct="1">
+              <a:lnSpc>
+                <a:spcPct val="100000"/>
+              </a:lnSpc>
+              <a:spcBef>
+                <a:spcPts val="0"/>
+              </a:spcBef>
+              <a:spcAft>
+                <a:spcPts val="0"/>
+              </a:spcAft>
+              <a:buClrTx/>
+              <a:buSzTx/>
+              <a:buFontTx/>
+              <a:buNone/>
+              <a:tabLst/>
+              <a:defRPr/>
+            </a:pPr>
+            <a:r>
+              <a:rPr lang="en-CA" dirty="0"/>
+              <a:t>Great Wall Motor Company Limited </a:t>
+            </a:r>
+          </a:p>
+          <a:p>
+            <a:pPr marL="0" marR="0" lvl="0" indent="0" algn="l" defTabSz="914400" rtl="0" eaLnBrk="1" fontAlgn="auto" latinLnBrk="0" hangingPunct="1">
+              <a:lnSpc>
+                <a:spcPct val="100000"/>
+              </a:lnSpc>
+              <a:spcBef>
+                <a:spcPts val="0"/>
+              </a:spcBef>
+              <a:spcAft>
+                <a:spcPts val="0"/>
+              </a:spcAft>
+              <a:buClrTx/>
+              <a:buSzTx/>
+              <a:buFontTx/>
+              <a:buNone/>
+              <a:tabLst/>
+              <a:defRPr/>
+            </a:pPr>
+            <a:r>
+              <a:rPr lang="en-CA" dirty="0"/>
+              <a:t>Isuzu Motors Limited </a:t>
+            </a:r>
+          </a:p>
+          <a:p>
+            <a:pPr marL="0" marR="0" lvl="0" indent="0" algn="l" defTabSz="914400" rtl="0" eaLnBrk="1" fontAlgn="auto" latinLnBrk="0" hangingPunct="1">
+              <a:lnSpc>
+                <a:spcPct val="100000"/>
+              </a:lnSpc>
+              <a:spcBef>
+                <a:spcPts val="0"/>
+              </a:spcBef>
+              <a:spcAft>
+                <a:spcPts val="0"/>
+              </a:spcAft>
+              <a:buClrTx/>
+              <a:buSzTx/>
+              <a:buFontTx/>
+              <a:buNone/>
+              <a:tabLst/>
+              <a:defRPr/>
+            </a:pPr>
+            <a:r>
+              <a:rPr lang="en-CA" dirty="0"/>
+              <a:t> AUDI AG  </a:t>
+            </a:r>
+          </a:p>
+          <a:p>
+            <a:pPr marL="0" marR="0" lvl="0" indent="0" algn="l" defTabSz="914400" rtl="0" eaLnBrk="1" fontAlgn="auto" latinLnBrk="0" hangingPunct="1">
+              <a:lnSpc>
+                <a:spcPct val="100000"/>
+              </a:lnSpc>
+              <a:spcBef>
+                <a:spcPts val="0"/>
+              </a:spcBef>
+              <a:spcAft>
+                <a:spcPts val="0"/>
+              </a:spcAft>
+              <a:buClrTx/>
+              <a:buSzTx/>
+              <a:buFontTx/>
+              <a:buNone/>
+              <a:tabLst/>
+              <a:defRPr/>
+            </a:pPr>
+            <a:r>
+              <a:rPr lang="en-CA" dirty="0"/>
+              <a:t> Tata Motors Limited   </a:t>
+            </a:r>
+          </a:p>
+          <a:p>
+            <a:pPr marL="0" marR="0" lvl="0" indent="0" algn="l" defTabSz="914400" rtl="0" eaLnBrk="1" fontAlgn="auto" latinLnBrk="0" hangingPunct="1">
+              <a:lnSpc>
+                <a:spcPct val="100000"/>
+              </a:lnSpc>
+              <a:spcBef>
+                <a:spcPts val="0"/>
+              </a:spcBef>
+              <a:spcAft>
+                <a:spcPts val="0"/>
+              </a:spcAft>
+              <a:buClrTx/>
+              <a:buSzTx/>
+              <a:buFontTx/>
+              <a:buNone/>
+              <a:tabLst/>
+              <a:defRPr/>
+            </a:pPr>
+            <a:endParaRPr lang="en-CA" dirty="0"/>
+          </a:p>
+          <a:p>
+            <a:pPr marL="0" marR="0" lvl="0" indent="0" algn="l" defTabSz="914400" rtl="0" eaLnBrk="1" fontAlgn="auto" latinLnBrk="0" hangingPunct="1">
+              <a:lnSpc>
+                <a:spcPct val="100000"/>
+              </a:lnSpc>
+              <a:spcBef>
+                <a:spcPts val="0"/>
+              </a:spcBef>
+              <a:spcAft>
+                <a:spcPts val="0"/>
+              </a:spcAft>
+              <a:buClrTx/>
+              <a:buSzTx/>
+              <a:buFontTx/>
+              <a:buNone/>
+              <a:tabLst/>
+              <a:defRPr/>
+            </a:pPr>
+            <a:r>
+              <a:rPr lang="en-CA" dirty="0"/>
+              <a:t> LTM EBITDA Margin % 0.095 LTM Total Revenues, 1 Yr Growth % -0.135</a:t>
+            </a:r>
+          </a:p>
+        </p:txBody>
+      </p:sp>
+      <p:sp>
+        <p:nvSpPr>
+          <p:cNvPr id="4" name="投影片編號版面配置區 3"/>
+          <p:cNvSpPr>
+            <a:spLocks noGrp="1"/>
+          </p:cNvSpPr>
+          <p:nvPr>
+            <p:ph type="sldNum" sz="quarter" idx="5"/>
+          </p:nvPr>
+        </p:nvSpPr>
+        <p:spPr/>
+        <p:txBody>
+          <a:bodyPr/>
+          <a:lstStyle/>
+          <a:p>
+            <a:fld id="{F04FAADE-AF7C-674A-8416-E968B9033EF2}" type="slidenum">
+              <a:rPr lang="en-US" smtClean="0"/>
+              <a:t>4</a:t>
+            </a:fld>
+            <a:endParaRPr lang="en-US" dirty="0"/>
+          </a:p>
+        </p:txBody>
+      </p:sp>
+    </p:spTree>
+    <p:extLst>
+      <p:ext uri="{BB962C8B-B14F-4D97-AF65-F5344CB8AC3E}">
         <p14:creationId xmlns:p14="http://schemas.microsoft.com/office/powerpoint/2010/main" val="2191693600"/>
+      </p:ext>
+    </p:extLst>
+  </p:cSld>
+  <p:clrMapOvr>
+    <a:masterClrMapping/>
+  </p:clrMapOvr>
+</p:notes>
+</file>
+
+<file path=ppt/notesSlides/notesSlide5.xml><?xml version="1.0" encoding="utf-8"?>
+<p:notes xmlns:a="http://schemas.openxmlformats.org/drawingml/2006/main" xmlns:r="http://schemas.openxmlformats.org/officeDocument/2006/relationships" xmlns:p="http://schemas.openxmlformats.org/presentationml/2006/main">
+  <p:cSld>
+    <p:spTree>
+      <p:nvGrpSpPr>
+        <p:cNvPr id="1" name=""/>
+        <p:cNvGrpSpPr/>
+        <p:nvPr/>
+      </p:nvGrpSpPr>
+      <p:grpSpPr>
+        <a:xfrm>
+          <a:off x="0" y="0"/>
+          <a:ext cx="0" cy="0"/>
+          <a:chOff x="0" y="0"/>
+          <a:chExt cx="0" cy="0"/>
+        </a:xfrm>
+      </p:grpSpPr>
+      <p:sp>
+        <p:nvSpPr>
+          <p:cNvPr id="2" name="投影片影像版面配置區 1"/>
+          <p:cNvSpPr>
+            <a:spLocks noGrp="1" noRot="1" noChangeAspect="1"/>
+          </p:cNvSpPr>
+          <p:nvPr>
+            <p:ph type="sldImg"/>
+          </p:nvPr>
+        </p:nvSpPr>
+        <p:spPr/>
+      </p:sp>
+      <p:sp>
+        <p:nvSpPr>
+          <p:cNvPr id="3" name="備忘稿版面配置區 2"/>
+          <p:cNvSpPr>
+            <a:spLocks noGrp="1"/>
+          </p:cNvSpPr>
+          <p:nvPr>
+            <p:ph type="body" idx="1"/>
+          </p:nvPr>
+        </p:nvSpPr>
+        <p:spPr/>
+        <p:txBody>
+          <a:bodyPr/>
+          <a:lstStyle/>
+          <a:p>
+            <a:pPr marL="0" marR="0" lvl="0" indent="0" algn="l" defTabSz="914400" rtl="0" eaLnBrk="1" fontAlgn="auto" latinLnBrk="0" hangingPunct="1">
+              <a:lnSpc>
+                <a:spcPct val="100000"/>
+              </a:lnSpc>
+              <a:spcBef>
+                <a:spcPts val="0"/>
+              </a:spcBef>
+              <a:spcAft>
+                <a:spcPts val="0"/>
+              </a:spcAft>
+              <a:buClrTx/>
+              <a:buSzTx/>
+              <a:buFontTx/>
+              <a:buNone/>
+              <a:tabLst/>
+              <a:defRPr/>
+            </a:pPr>
+            <a:r>
+              <a:rPr lang="fr-FR" b="1" i="0" dirty="0">
+                <a:effectLst/>
+                <a:latin typeface="-apple-system"/>
+              </a:rPr>
+              <a:t>TEV/Total Revenues LTM – Latest </a:t>
+            </a:r>
+            <a:r>
+              <a:rPr lang="en-CA" dirty="0">
+                <a:effectLst/>
+              </a:rPr>
+              <a:t>14.3</a:t>
+            </a:r>
+          </a:p>
+          <a:p>
+            <a:pPr marL="0" marR="0" lvl="0" indent="0" algn="l" defTabSz="914400" rtl="0" eaLnBrk="1" fontAlgn="auto" latinLnBrk="0" hangingPunct="1">
+              <a:lnSpc>
+                <a:spcPct val="100000"/>
+              </a:lnSpc>
+              <a:spcBef>
+                <a:spcPts val="0"/>
+              </a:spcBef>
+              <a:spcAft>
+                <a:spcPts val="0"/>
+              </a:spcAft>
+              <a:buClrTx/>
+              <a:buSzTx/>
+              <a:buFontTx/>
+              <a:buNone/>
+              <a:tabLst/>
+              <a:defRPr/>
+            </a:pPr>
+            <a:r>
+              <a:rPr lang="en-CA" b="1" i="0" dirty="0">
+                <a:effectLst/>
+                <a:latin typeface="-apple-system"/>
+              </a:rPr>
+              <a:t>TEV/EBITDA LTM – Latest </a:t>
+            </a:r>
+            <a:r>
+              <a:rPr lang="en-CA" dirty="0">
+                <a:effectLst/>
+              </a:rPr>
+              <a:t>90.8</a:t>
+            </a:r>
+            <a:br>
+              <a:rPr lang="en-CA" dirty="0"/>
+            </a:br>
+            <a:endParaRPr lang="en-CA" dirty="0"/>
+          </a:p>
+          <a:p>
+            <a:pPr marL="0" marR="0" lvl="0" indent="0" algn="l" defTabSz="914400" rtl="0" eaLnBrk="1" fontAlgn="auto" latinLnBrk="0" hangingPunct="1">
+              <a:lnSpc>
+                <a:spcPct val="100000"/>
+              </a:lnSpc>
+              <a:spcBef>
+                <a:spcPts val="0"/>
+              </a:spcBef>
+              <a:spcAft>
+                <a:spcPts val="0"/>
+              </a:spcAft>
+              <a:buClrTx/>
+              <a:buSzTx/>
+              <a:buFontTx/>
+              <a:buNone/>
+              <a:tabLst/>
+              <a:defRPr/>
+            </a:pPr>
+            <a:r>
+              <a:rPr lang="en-CA" dirty="0"/>
+              <a:t>Industry 50</a:t>
+            </a:r>
+            <a:r>
+              <a:rPr lang="en-CA" baseline="30000" dirty="0"/>
+              <a:t>th</a:t>
+            </a:r>
+            <a:r>
+              <a:rPr lang="en-CA" dirty="0"/>
+              <a:t> percentile </a:t>
+            </a:r>
+          </a:p>
+          <a:p>
+            <a:pPr marL="0" marR="0" lvl="0" indent="0" algn="l" defTabSz="914400" rtl="0" eaLnBrk="1" fontAlgn="auto" latinLnBrk="0" hangingPunct="1">
+              <a:lnSpc>
+                <a:spcPct val="100000"/>
+              </a:lnSpc>
+              <a:spcBef>
+                <a:spcPts val="0"/>
+              </a:spcBef>
+              <a:spcAft>
+                <a:spcPts val="0"/>
+              </a:spcAft>
+              <a:buClrTx/>
+              <a:buSzTx/>
+              <a:buFontTx/>
+              <a:buNone/>
+              <a:tabLst/>
+              <a:defRPr/>
+            </a:pPr>
+            <a:r>
+              <a:rPr lang="en-CA" dirty="0"/>
+              <a:t>TEV/Total Revenues LTM - Latest 1.2 TEV/EBITDA LTM - Latest 16.6</a:t>
+            </a:r>
+          </a:p>
+        </p:txBody>
+      </p:sp>
+      <p:sp>
+        <p:nvSpPr>
+          <p:cNvPr id="4" name="投影片編號版面配置區 3"/>
+          <p:cNvSpPr>
+            <a:spLocks noGrp="1"/>
+          </p:cNvSpPr>
+          <p:nvPr>
+            <p:ph type="sldNum" sz="quarter" idx="5"/>
+          </p:nvPr>
+        </p:nvSpPr>
+        <p:spPr/>
+        <p:txBody>
+          <a:bodyPr/>
+          <a:lstStyle/>
+          <a:p>
+            <a:fld id="{F04FAADE-AF7C-674A-8416-E968B9033EF2}" type="slidenum">
+              <a:rPr lang="en-US" smtClean="0"/>
+              <a:t>5</a:t>
+            </a:fld>
+            <a:endParaRPr lang="en-US" dirty="0"/>
+          </a:p>
+        </p:txBody>
+      </p:sp>
+    </p:spTree>
+    <p:extLst>
+      <p:ext uri="{BB962C8B-B14F-4D97-AF65-F5344CB8AC3E}">
+        <p14:creationId xmlns:p14="http://schemas.microsoft.com/office/powerpoint/2010/main" val="1780332967"/>
+      </p:ext>
+    </p:extLst>
+  </p:cSld>
+  <p:clrMapOvr>
+    <a:masterClrMapping/>
+  </p:clrMapOvr>
+</p:notes>
+</file>
+
+<file path=ppt/notesSlides/notesSlide6.xml><?xml version="1.0" encoding="utf-8"?>
+<p:notes xmlns:a="http://schemas.openxmlformats.org/drawingml/2006/main" xmlns:r="http://schemas.openxmlformats.org/officeDocument/2006/relationships" xmlns:p="http://schemas.openxmlformats.org/presentationml/2006/main">
+  <p:cSld>
+    <p:spTree>
+      <p:nvGrpSpPr>
+        <p:cNvPr id="1" name=""/>
+        <p:cNvGrpSpPr/>
+        <p:nvPr/>
+      </p:nvGrpSpPr>
+      <p:grpSpPr>
+        <a:xfrm>
+          <a:off x="0" y="0"/>
+          <a:ext cx="0" cy="0"/>
+          <a:chOff x="0" y="0"/>
+          <a:chExt cx="0" cy="0"/>
+        </a:xfrm>
+      </p:grpSpPr>
+      <p:sp>
+        <p:nvSpPr>
+          <p:cNvPr id="2" name="投影片影像版面配置區 1"/>
+          <p:cNvSpPr>
+            <a:spLocks noGrp="1" noRot="1" noChangeAspect="1"/>
+          </p:cNvSpPr>
+          <p:nvPr>
+            <p:ph type="sldImg"/>
+          </p:nvPr>
+        </p:nvSpPr>
+        <p:spPr/>
+      </p:sp>
+      <p:sp>
+        <p:nvSpPr>
+          <p:cNvPr id="3" name="備忘稿版面配置區 2"/>
+          <p:cNvSpPr>
+            <a:spLocks noGrp="1"/>
+          </p:cNvSpPr>
+          <p:nvPr>
+            <p:ph type="body" idx="1"/>
+          </p:nvPr>
+        </p:nvSpPr>
+        <p:spPr/>
+        <p:txBody>
+          <a:bodyPr/>
+          <a:lstStyle/>
+          <a:p>
+            <a:pPr marL="0" marR="0" lvl="0" indent="0" algn="l" defTabSz="914400" rtl="0" eaLnBrk="1" fontAlgn="auto" latinLnBrk="0" hangingPunct="1">
+              <a:lnSpc>
+                <a:spcPct val="100000"/>
+              </a:lnSpc>
+              <a:spcBef>
+                <a:spcPts val="0"/>
+              </a:spcBef>
+              <a:spcAft>
+                <a:spcPts val="0"/>
+              </a:spcAft>
+              <a:buClrTx/>
+              <a:buSzTx/>
+              <a:buFontTx/>
+              <a:buNone/>
+              <a:tabLst/>
+              <a:defRPr/>
+            </a:pPr>
+            <a:endParaRPr lang="en-CA" dirty="0"/>
+          </a:p>
+        </p:txBody>
+      </p:sp>
+      <p:sp>
+        <p:nvSpPr>
+          <p:cNvPr id="4" name="投影片編號版面配置區 3"/>
+          <p:cNvSpPr>
+            <a:spLocks noGrp="1"/>
+          </p:cNvSpPr>
+          <p:nvPr>
+            <p:ph type="sldNum" sz="quarter" idx="5"/>
+          </p:nvPr>
+        </p:nvSpPr>
+        <p:spPr/>
+        <p:txBody>
+          <a:bodyPr/>
+          <a:lstStyle/>
+          <a:p>
+            <a:fld id="{F04FAADE-AF7C-674A-8416-E968B9033EF2}" type="slidenum">
+              <a:rPr lang="en-US" smtClean="0"/>
+              <a:t>6</a:t>
+            </a:fld>
+            <a:endParaRPr lang="en-US" dirty="0"/>
+          </a:p>
+        </p:txBody>
+      </p:sp>
+    </p:spTree>
+    <p:extLst>
+      <p:ext uri="{BB962C8B-B14F-4D97-AF65-F5344CB8AC3E}">
+        <p14:creationId xmlns:p14="http://schemas.microsoft.com/office/powerpoint/2010/main" val="1427759235"/>
       </p:ext>
     </p:extLst>
   </p:cSld>
@@ -2536,6 +3174,156 @@
         <p:spPr>
           <a:xfrm>
             <a:off x="709656" y="1024493"/>
+            <a:ext cx="7272000" cy="272715"/>
+          </a:xfrm>
+          <a:prstGeom prst="rect">
+            <a:avLst/>
+          </a:prstGeom>
+          <a:solidFill>
+            <a:srgbClr val="BC0000"/>
+          </a:solidFill>
+          <a:ln>
+            <a:noFill/>
+          </a:ln>
+          <a:effectLst>
+            <a:outerShdw blurRad="50800" dist="38100" dir="2700000" algn="tl" rotWithShape="0">
+              <a:prstClr val="black">
+                <a:alpha val="40000"/>
+              </a:prstClr>
+            </a:outerShdw>
+          </a:effectLst>
+        </p:spPr>
+        <p:style>
+          <a:lnRef idx="2">
+            <a:schemeClr val="accent1">
+              <a:shade val="50000"/>
+            </a:schemeClr>
+          </a:lnRef>
+          <a:fillRef idx="1">
+            <a:schemeClr val="accent1"/>
+          </a:fillRef>
+          <a:effectRef idx="0">
+            <a:schemeClr val="accent1"/>
+          </a:effectRef>
+          <a:fontRef idx="minor">
+            <a:schemeClr val="lt1"/>
+          </a:fontRef>
+        </p:style>
+        <p:txBody>
+          <a:bodyPr rtlCol="0" anchor="ctr"/>
+          <a:lstStyle>
+            <a:defPPr>
+              <a:defRPr lang="en-US"/>
+            </a:defPPr>
+            <a:lvl1pPr marR="0" lvl="0" indent="0" algn="ctr" fontAlgn="auto">
+              <a:lnSpc>
+                <a:spcPct val="100000"/>
+              </a:lnSpc>
+              <a:spcBef>
+                <a:spcPts val="0"/>
+              </a:spcBef>
+              <a:spcAft>
+                <a:spcPts val="0"/>
+              </a:spcAft>
+              <a:buClrTx/>
+              <a:buSzTx/>
+              <a:buFontTx/>
+              <a:buNone/>
+              <a:tabLst/>
+              <a:defRPr kumimoji="0" sz="1400" b="1" i="0" u="none" strike="noStrike" cap="none" spc="0" normalizeH="0" baseline="0">
+                <a:ln>
+                  <a:noFill/>
+                </a:ln>
+                <a:solidFill>
+                  <a:prstClr val="white"/>
+                </a:solidFill>
+                <a:effectLst/>
+                <a:uLnTx/>
+                <a:uFillTx/>
+                <a:latin typeface="Arial" panose="020B0604020202020204" pitchFamily="34" charset="0"/>
+                <a:ea typeface="微软雅黑" panose="020B0503020204020204" pitchFamily="34" charset="-122"/>
+              </a:defRPr>
+            </a:lvl1pPr>
+            <a:lvl2pPr>
+              <a:defRPr>
+                <a:solidFill>
+                  <a:schemeClr val="lt1"/>
+                </a:solidFill>
+              </a:defRPr>
+            </a:lvl2pPr>
+            <a:lvl3pPr>
+              <a:defRPr>
+                <a:solidFill>
+                  <a:schemeClr val="lt1"/>
+                </a:solidFill>
+              </a:defRPr>
+            </a:lvl3pPr>
+            <a:lvl4pPr>
+              <a:defRPr>
+                <a:solidFill>
+                  <a:schemeClr val="lt1"/>
+                </a:solidFill>
+              </a:defRPr>
+            </a:lvl4pPr>
+            <a:lvl5pPr>
+              <a:defRPr>
+                <a:solidFill>
+                  <a:schemeClr val="lt1"/>
+                </a:solidFill>
+              </a:defRPr>
+            </a:lvl5pPr>
+            <a:lvl6pPr>
+              <a:defRPr>
+                <a:solidFill>
+                  <a:schemeClr val="lt1"/>
+                </a:solidFill>
+              </a:defRPr>
+            </a:lvl6pPr>
+            <a:lvl7pPr>
+              <a:defRPr>
+                <a:solidFill>
+                  <a:schemeClr val="lt1"/>
+                </a:solidFill>
+              </a:defRPr>
+            </a:lvl7pPr>
+            <a:lvl8pPr>
+              <a:defRPr>
+                <a:solidFill>
+                  <a:schemeClr val="lt1"/>
+                </a:solidFill>
+              </a:defRPr>
+            </a:lvl8pPr>
+            <a:lvl9pPr>
+              <a:defRPr>
+                <a:solidFill>
+                  <a:schemeClr val="lt1"/>
+                </a:solidFill>
+              </a:defRPr>
+            </a:lvl9pPr>
+          </a:lstStyle>
+          <a:p>
+            <a:r>
+              <a:rPr lang="en-US" altLang="zh-CN" dirty="0"/>
+              <a:t>Income Metrics- Net Income, EBITDA, Revenue</a:t>
+            </a:r>
+          </a:p>
+        </p:txBody>
+      </p:sp>
+      <p:sp>
+        <p:nvSpPr>
+          <p:cNvPr id="30" name="文字方塊 29">
+            <a:extLst>
+              <a:ext uri="{FF2B5EF4-FFF2-40B4-BE49-F238E27FC236}">
+                <a16:creationId xmlns:a16="http://schemas.microsoft.com/office/drawing/2014/main" id="{06C038A2-8E05-4238-849A-4CF19C45BFC3}"/>
+              </a:ext>
+            </a:extLst>
+          </p:cNvPr>
+          <p:cNvSpPr txBox="1"/>
+          <p:nvPr/>
+        </p:nvSpPr>
+        <p:spPr>
+          <a:xfrm>
+            <a:off x="8500796" y="1024493"/>
             <a:ext cx="3528000" cy="272715"/>
           </a:xfrm>
           <a:prstGeom prst="rect">
@@ -2666,17 +3454,17 @@
           <a:p>
             <a:r>
               <a:rPr lang="en-CA" altLang="zh-CN" dirty="0"/>
-              <a:t>Revenue</a:t>
-            </a:r>
-          </a:p>
-        </p:txBody>
-      </p:sp>
-      <p:sp>
-        <p:nvSpPr>
-          <p:cNvPr id="17" name="文字方塊 16">
+              <a:t>Profitability</a:t>
+            </a:r>
+          </a:p>
+        </p:txBody>
+      </p:sp>
+      <p:sp>
+        <p:nvSpPr>
+          <p:cNvPr id="12" name="文本框 90">
             <a:extLst>
               <a:ext uri="{FF2B5EF4-FFF2-40B4-BE49-F238E27FC236}">
-                <a16:creationId xmlns:a16="http://schemas.microsoft.com/office/drawing/2014/main" id="{DF0285C3-10B6-4F4F-8C4D-E40D54A447E5}"/>
+                <a16:creationId xmlns:a16="http://schemas.microsoft.com/office/drawing/2014/main" id="{8803F9D3-57BD-4F87-9B87-0C5D590B7B31}"/>
               </a:ext>
             </a:extLst>
           </p:cNvPr>
@@ -2685,8 +3473,420 @@
         </p:nvSpPr>
         <p:spPr>
           <a:xfrm>
-            <a:off x="6243319" y="3537505"/>
-            <a:ext cx="5294823" cy="276999"/>
+            <a:off x="914530" y="6420618"/>
+            <a:ext cx="5209371" cy="395749"/>
+          </a:xfrm>
+          <a:prstGeom prst="rect">
+            <a:avLst/>
+          </a:prstGeom>
+        </p:spPr>
+        <p:txBody>
+          <a:bodyPr wrap="square" rtlCol="0">
+            <a:spAutoFit/>
+          </a:bodyPr>
+          <a:lstStyle/>
+          <a:p>
+            <a:pPr>
+              <a:lnSpc>
+                <a:spcPct val="130000"/>
+              </a:lnSpc>
+              <a:spcBef>
+                <a:spcPts val="600"/>
+              </a:spcBef>
+            </a:pPr>
+            <a:r>
+              <a:rPr lang="en-US" altLang="zh-TW" sz="800" dirty="0">
+                <a:latin typeface="Arial" panose="020B0604020202020204" pitchFamily="34" charset="0"/>
+                <a:cs typeface="Arial" panose="020B0604020202020204" pitchFamily="34" charset="0"/>
+              </a:rPr>
+              <a:t>Source </a:t>
+            </a:r>
+            <a:r>
+              <a:rPr lang="zh-TW" altLang="en-US" sz="800" dirty="0">
+                <a:latin typeface="Arial" panose="020B0604020202020204" pitchFamily="34" charset="0"/>
+                <a:cs typeface="Arial" panose="020B0604020202020204" pitchFamily="34" charset="0"/>
+              </a:rPr>
+              <a:t>：</a:t>
+            </a:r>
+            <a:r>
+              <a:rPr lang="en-CA" altLang="zh-TW" sz="800" dirty="0">
+                <a:latin typeface="Arial" panose="020B0604020202020204" pitchFamily="34" charset="0"/>
+                <a:cs typeface="Arial" panose="020B0604020202020204" pitchFamily="34" charset="0"/>
+              </a:rPr>
+              <a:t>FactSet, Equity Research Report, FS. Note 1, adjusted EBITDA = EBITDA </a:t>
+            </a:r>
+            <a:r>
+              <a:rPr lang="en-CA" sz="800" dirty="0"/>
+              <a:t>excludes share based payments</a:t>
+            </a:r>
+            <a:endParaRPr lang="zh-CN" altLang="en-US" sz="800" dirty="0">
+              <a:latin typeface="Arial" panose="020B0604020202020204" pitchFamily="34" charset="0"/>
+              <a:cs typeface="Arial" panose="020B0604020202020204" pitchFamily="34" charset="0"/>
+            </a:endParaRPr>
+          </a:p>
+        </p:txBody>
+      </p:sp>
+      <p:sp>
+        <p:nvSpPr>
+          <p:cNvPr id="31" name="投影片編號版面配置區 3">
+            <a:extLst>
+              <a:ext uri="{FF2B5EF4-FFF2-40B4-BE49-F238E27FC236}">
+                <a16:creationId xmlns:a16="http://schemas.microsoft.com/office/drawing/2014/main" id="{C8391994-E840-45DD-9B76-C71BE2D0869D}"/>
+              </a:ext>
+            </a:extLst>
+          </p:cNvPr>
+          <p:cNvSpPr txBox="1">
+            <a:spLocks/>
+          </p:cNvSpPr>
+          <p:nvPr/>
+        </p:nvSpPr>
+        <p:spPr>
+          <a:xfrm>
+            <a:off x="524656" y="6356358"/>
+            <a:ext cx="2743200" cy="365125"/>
+          </a:xfrm>
+          <a:prstGeom prst="rect">
+            <a:avLst/>
+          </a:prstGeom>
+        </p:spPr>
+        <p:txBody>
+          <a:bodyPr vert="horz" lIns="91440" tIns="45720" rIns="91440" bIns="45720" rtlCol="0" anchor="ctr"/>
+          <a:lstStyle>
+            <a:defPPr>
+              <a:defRPr lang="en-US"/>
+            </a:defPPr>
+            <a:lvl1pPr marL="0" algn="l" defTabSz="914400" rtl="0" eaLnBrk="1" latinLnBrk="0" hangingPunct="1">
+              <a:defRPr sz="1000" b="0" i="0" kern="1200">
+                <a:solidFill>
+                  <a:schemeClr val="tx1">
+                    <a:tint val="75000"/>
+                  </a:schemeClr>
+                </a:solidFill>
+                <a:latin typeface="Microsoft YaHei" charset="-122"/>
+                <a:ea typeface="Microsoft YaHei" charset="-122"/>
+                <a:cs typeface="Microsoft YaHei" charset="-122"/>
+              </a:defRPr>
+            </a:lvl1pPr>
+            <a:lvl2pPr marL="457200" algn="l" defTabSz="914400" rtl="0" eaLnBrk="1" latinLnBrk="0" hangingPunct="1">
+              <a:defRPr sz="1800" kern="1200">
+                <a:solidFill>
+                  <a:schemeClr val="tx1"/>
+                </a:solidFill>
+                <a:latin typeface="+mn-lt"/>
+                <a:ea typeface="+mn-ea"/>
+                <a:cs typeface="+mn-cs"/>
+              </a:defRPr>
+            </a:lvl2pPr>
+            <a:lvl3pPr marL="914400" algn="l" defTabSz="914400" rtl="0" eaLnBrk="1" latinLnBrk="0" hangingPunct="1">
+              <a:defRPr sz="1800" kern="1200">
+                <a:solidFill>
+                  <a:schemeClr val="tx1"/>
+                </a:solidFill>
+                <a:latin typeface="+mn-lt"/>
+                <a:ea typeface="+mn-ea"/>
+                <a:cs typeface="+mn-cs"/>
+              </a:defRPr>
+            </a:lvl3pPr>
+            <a:lvl4pPr marL="1371600" algn="l" defTabSz="914400" rtl="0" eaLnBrk="1" latinLnBrk="0" hangingPunct="1">
+              <a:defRPr sz="1800" kern="1200">
+                <a:solidFill>
+                  <a:schemeClr val="tx1"/>
+                </a:solidFill>
+                <a:latin typeface="+mn-lt"/>
+                <a:ea typeface="+mn-ea"/>
+                <a:cs typeface="+mn-cs"/>
+              </a:defRPr>
+            </a:lvl4pPr>
+            <a:lvl5pPr marL="1828800" algn="l" defTabSz="914400" rtl="0" eaLnBrk="1" latinLnBrk="0" hangingPunct="1">
+              <a:defRPr sz="1800" kern="1200">
+                <a:solidFill>
+                  <a:schemeClr val="tx1"/>
+                </a:solidFill>
+                <a:latin typeface="+mn-lt"/>
+                <a:ea typeface="+mn-ea"/>
+                <a:cs typeface="+mn-cs"/>
+              </a:defRPr>
+            </a:lvl5pPr>
+            <a:lvl6pPr marL="2286000" algn="l" defTabSz="914400" rtl="0" eaLnBrk="1" latinLnBrk="0" hangingPunct="1">
+              <a:defRPr sz="1800" kern="1200">
+                <a:solidFill>
+                  <a:schemeClr val="tx1"/>
+                </a:solidFill>
+                <a:latin typeface="+mn-lt"/>
+                <a:ea typeface="+mn-ea"/>
+                <a:cs typeface="+mn-cs"/>
+              </a:defRPr>
+            </a:lvl6pPr>
+            <a:lvl7pPr marL="2743200" algn="l" defTabSz="914400" rtl="0" eaLnBrk="1" latinLnBrk="0" hangingPunct="1">
+              <a:defRPr sz="1800" kern="1200">
+                <a:solidFill>
+                  <a:schemeClr val="tx1"/>
+                </a:solidFill>
+                <a:latin typeface="+mn-lt"/>
+                <a:ea typeface="+mn-ea"/>
+                <a:cs typeface="+mn-cs"/>
+              </a:defRPr>
+            </a:lvl7pPr>
+            <a:lvl8pPr marL="3200400" algn="l" defTabSz="914400" rtl="0" eaLnBrk="1" latinLnBrk="0" hangingPunct="1">
+              <a:defRPr sz="1800" kern="1200">
+                <a:solidFill>
+                  <a:schemeClr val="tx1"/>
+                </a:solidFill>
+                <a:latin typeface="+mn-lt"/>
+                <a:ea typeface="+mn-ea"/>
+                <a:cs typeface="+mn-cs"/>
+              </a:defRPr>
+            </a:lvl8pPr>
+            <a:lvl9pPr marL="3657600" algn="l" defTabSz="914400" rtl="0" eaLnBrk="1" latinLnBrk="0" hangingPunct="1">
+              <a:defRPr sz="1800" kern="1200">
+                <a:solidFill>
+                  <a:schemeClr val="tx1"/>
+                </a:solidFill>
+                <a:latin typeface="+mn-lt"/>
+                <a:ea typeface="+mn-ea"/>
+                <a:cs typeface="+mn-cs"/>
+              </a:defRPr>
+            </a:lvl9pPr>
+          </a:lstStyle>
+          <a:p>
+            <a:fld id="{B7F7B65C-2824-9347-9C05-39D42996E2F4}" type="slidenum">
+              <a:rPr lang="fr-FR" smtClean="0"/>
+              <a:pPr/>
+              <a:t>2</a:t>
+            </a:fld>
+            <a:endParaRPr lang="fr-FR" dirty="0"/>
+          </a:p>
+        </p:txBody>
+      </p:sp>
+      <p:pic>
+        <p:nvPicPr>
+          <p:cNvPr id="4" name="圖片 3">
+            <a:extLst>
+              <a:ext uri="{FF2B5EF4-FFF2-40B4-BE49-F238E27FC236}">
+                <a16:creationId xmlns:a16="http://schemas.microsoft.com/office/drawing/2014/main" id="{1355BA86-E8D3-4D72-83C0-05C884CD329F}"/>
+              </a:ext>
+            </a:extLst>
+          </p:cNvPr>
+          <p:cNvPicPr>
+            <a:picLocks noChangeAspect="1"/>
+          </p:cNvPicPr>
+          <p:nvPr/>
+        </p:nvPicPr>
+        <p:blipFill>
+          <a:blip r:embed="rId3"/>
+          <a:stretch>
+            <a:fillRect/>
+          </a:stretch>
+        </p:blipFill>
+        <p:spPr>
+          <a:xfrm>
+            <a:off x="524656" y="1430761"/>
+            <a:ext cx="7588640" cy="4584936"/>
+          </a:xfrm>
+          <a:prstGeom prst="rect">
+            <a:avLst/>
+          </a:prstGeom>
+        </p:spPr>
+      </p:pic>
+      <p:sp>
+        <p:nvSpPr>
+          <p:cNvPr id="5" name="文字方塊 4">
+            <a:extLst>
+              <a:ext uri="{FF2B5EF4-FFF2-40B4-BE49-F238E27FC236}">
+                <a16:creationId xmlns:a16="http://schemas.microsoft.com/office/drawing/2014/main" id="{B6B4D4F2-C716-49F1-84A5-D40534C9B1B6}"/>
+              </a:ext>
+            </a:extLst>
+          </p:cNvPr>
+          <p:cNvSpPr txBox="1"/>
+          <p:nvPr/>
+        </p:nvSpPr>
+        <p:spPr>
+          <a:xfrm>
+            <a:off x="8500796" y="1926771"/>
+            <a:ext cx="3528000" cy="1477328"/>
+          </a:xfrm>
+          <a:prstGeom prst="rect">
+            <a:avLst/>
+          </a:prstGeom>
+          <a:noFill/>
+        </p:spPr>
+        <p:txBody>
+          <a:bodyPr wrap="square" rtlCol="0">
+            <a:spAutoFit/>
+          </a:bodyPr>
+          <a:lstStyle/>
+          <a:p>
+            <a:pPr marL="285750" indent="-285750">
+              <a:buFont typeface="Arial" panose="020B0604020202020204" pitchFamily="34" charset="0"/>
+              <a:buChar char="•"/>
+            </a:pPr>
+            <a:r>
+              <a:rPr lang="en-CA" dirty="0"/>
+              <a:t>Revenue CAGR</a:t>
+            </a:r>
+          </a:p>
+          <a:p>
+            <a:pPr marL="285750" indent="-285750">
+              <a:buFont typeface="Arial" panose="020B0604020202020204" pitchFamily="34" charset="0"/>
+              <a:buChar char="•"/>
+            </a:pPr>
+            <a:r>
+              <a:rPr lang="en-CA" dirty="0"/>
+              <a:t>Capex</a:t>
+            </a:r>
+          </a:p>
+          <a:p>
+            <a:pPr marL="285750" indent="-285750">
+              <a:buFont typeface="Arial" panose="020B0604020202020204" pitchFamily="34" charset="0"/>
+              <a:buChar char="•"/>
+            </a:pPr>
+            <a:r>
+              <a:rPr lang="en-CA" dirty="0"/>
+              <a:t>EBITDA YoY</a:t>
+            </a:r>
+          </a:p>
+          <a:p>
+            <a:pPr marL="285750" indent="-285750">
+              <a:buFont typeface="Arial" panose="020B0604020202020204" pitchFamily="34" charset="0"/>
+              <a:buChar char="•"/>
+            </a:pPr>
+            <a:r>
+              <a:rPr lang="en-CA" dirty="0"/>
+              <a:t>Net Income has turned positive in FY2020</a:t>
+            </a:r>
+          </a:p>
+        </p:txBody>
+      </p:sp>
+      <p:sp>
+        <p:nvSpPr>
+          <p:cNvPr id="7" name="矩形 6">
+            <a:extLst>
+              <a:ext uri="{FF2B5EF4-FFF2-40B4-BE49-F238E27FC236}">
+                <a16:creationId xmlns:a16="http://schemas.microsoft.com/office/drawing/2014/main" id="{0AB03224-DFC5-44E8-85E2-CBADF36EE40D}"/>
+              </a:ext>
+            </a:extLst>
+          </p:cNvPr>
+          <p:cNvSpPr/>
+          <p:nvPr/>
+        </p:nvSpPr>
+        <p:spPr>
+          <a:xfrm>
+            <a:off x="8584163" y="3965715"/>
+            <a:ext cx="3444633" cy="2390643"/>
+          </a:xfrm>
+          <a:prstGeom prst="rect">
+            <a:avLst/>
+          </a:prstGeom>
+        </p:spPr>
+        <p:style>
+          <a:lnRef idx="2">
+            <a:schemeClr val="accent1">
+              <a:shade val="50000"/>
+            </a:schemeClr>
+          </a:lnRef>
+          <a:fillRef idx="1">
+            <a:schemeClr val="accent1"/>
+          </a:fillRef>
+          <a:effectRef idx="0">
+            <a:schemeClr val="accent1"/>
+          </a:effectRef>
+          <a:fontRef idx="minor">
+            <a:schemeClr val="lt1"/>
+          </a:fontRef>
+        </p:style>
+        <p:txBody>
+          <a:bodyPr rtlCol="0" anchor="ctr"/>
+          <a:lstStyle/>
+          <a:p>
+            <a:pPr algn="ctr"/>
+            <a:r>
+              <a:rPr lang="en-CA" dirty="0"/>
+              <a:t>Description to be added</a:t>
+            </a:r>
+          </a:p>
+        </p:txBody>
+      </p:sp>
+    </p:spTree>
+    <p:extLst>
+      <p:ext uri="{BB962C8B-B14F-4D97-AF65-F5344CB8AC3E}">
+        <p14:creationId xmlns:p14="http://schemas.microsoft.com/office/powerpoint/2010/main" val="589510143"/>
+      </p:ext>
+    </p:extLst>
+  </p:cSld>
+  <p:clrMapOvr>
+    <a:masterClrMapping/>
+  </p:clrMapOvr>
+</p:sld>
+</file>
+
+<file path=ppt/slides/slide3.xml><?xml version="1.0" encoding="utf-8"?>
+<p:sld xmlns:a="http://schemas.openxmlformats.org/drawingml/2006/main" xmlns:r="http://schemas.openxmlformats.org/officeDocument/2006/relationships" xmlns:p="http://schemas.openxmlformats.org/presentationml/2006/main">
+  <p:cSld>
+    <p:spTree>
+      <p:nvGrpSpPr>
+        <p:cNvPr id="1" name=""/>
+        <p:cNvGrpSpPr/>
+        <p:nvPr/>
+      </p:nvGrpSpPr>
+      <p:grpSpPr>
+        <a:xfrm>
+          <a:off x="0" y="0"/>
+          <a:ext cx="0" cy="0"/>
+          <a:chOff x="0" y="0"/>
+          <a:chExt cx="0" cy="0"/>
+        </a:xfrm>
+      </p:grpSpPr>
+      <p:sp>
+        <p:nvSpPr>
+          <p:cNvPr id="2" name="標題 1">
+            <a:extLst>
+              <a:ext uri="{FF2B5EF4-FFF2-40B4-BE49-F238E27FC236}">
+                <a16:creationId xmlns:a16="http://schemas.microsoft.com/office/drawing/2014/main" id="{C9446F86-451E-40FA-88C7-B9BA2C8DDCDA}"/>
+              </a:ext>
+            </a:extLst>
+          </p:cNvPr>
+          <p:cNvSpPr>
+            <a:spLocks noGrp="1"/>
+          </p:cNvSpPr>
+          <p:nvPr>
+            <p:ph type="title"/>
+          </p:nvPr>
+        </p:nvSpPr>
+        <p:spPr/>
+        <p:txBody>
+          <a:bodyPr>
+            <a:normAutofit/>
+          </a:bodyPr>
+          <a:lstStyle/>
+          <a:p>
+            <a:r>
+              <a:rPr lang="en-CA" altLang="zh-TW" sz="2200" dirty="0">
+                <a:latin typeface="+mj-lt"/>
+              </a:rPr>
+              <a:t>TSLA-Financial Analysis </a:t>
+            </a:r>
+            <a:endParaRPr lang="en-CA" sz="2200" dirty="0">
+              <a:latin typeface="+mj-lt"/>
+            </a:endParaRPr>
+          </a:p>
+        </p:txBody>
+      </p:sp>
+      <p:sp>
+        <p:nvSpPr>
+          <p:cNvPr id="6" name="文字方塊 5">
+            <a:extLst>
+              <a:ext uri="{FF2B5EF4-FFF2-40B4-BE49-F238E27FC236}">
+                <a16:creationId xmlns:a16="http://schemas.microsoft.com/office/drawing/2014/main" id="{046C4879-DB76-4C9D-9EBD-A8E62ABEDFFF}"/>
+              </a:ext>
+            </a:extLst>
+          </p:cNvPr>
+          <p:cNvSpPr txBox="1"/>
+          <p:nvPr/>
+        </p:nvSpPr>
+        <p:spPr>
+          <a:xfrm>
+            <a:off x="709656" y="1024493"/>
+            <a:ext cx="5544000" cy="279928"/>
           </a:xfrm>
           <a:prstGeom prst="rect">
             <a:avLst/>
@@ -2818,7 +4018,7 @@
               <a:rPr lang="en-CA" altLang="zh-TW" dirty="0">
                 <a:sym typeface="Arial"/>
               </a:rPr>
-              <a:t>Valuation Highlights  - Comps model</a:t>
+              <a:t>Short-term Liquidity Analysis</a:t>
             </a:r>
             <a:endParaRPr lang="zh-TW" altLang="en-US" dirty="0">
               <a:sym typeface="Arial"/>
@@ -2828,10 +4028,10 @@
       </p:sp>
       <p:sp>
         <p:nvSpPr>
-          <p:cNvPr id="27" name="文字方塊 26">
+          <p:cNvPr id="12" name="文本框 90">
             <a:extLst>
               <a:ext uri="{FF2B5EF4-FFF2-40B4-BE49-F238E27FC236}">
-                <a16:creationId xmlns:a16="http://schemas.microsoft.com/office/drawing/2014/main" id="{95230E69-EF69-48A1-AB8C-BAEE7746519D}"/>
+                <a16:creationId xmlns:a16="http://schemas.microsoft.com/office/drawing/2014/main" id="{8803F9D3-57BD-4F87-9B87-0C5D590B7B31}"/>
               </a:ext>
             </a:extLst>
           </p:cNvPr>
@@ -2840,8 +4040,203 @@
         </p:nvSpPr>
         <p:spPr>
           <a:xfrm>
-            <a:off x="709656" y="3537505"/>
-            <a:ext cx="5239022" cy="272715"/>
+            <a:off x="914530" y="6420618"/>
+            <a:ext cx="5209371" cy="236603"/>
+          </a:xfrm>
+          <a:prstGeom prst="rect">
+            <a:avLst/>
+          </a:prstGeom>
+        </p:spPr>
+        <p:txBody>
+          <a:bodyPr wrap="square" rtlCol="0">
+            <a:spAutoFit/>
+          </a:bodyPr>
+          <a:lstStyle/>
+          <a:p>
+            <a:pPr>
+              <a:lnSpc>
+                <a:spcPct val="130000"/>
+              </a:lnSpc>
+              <a:spcBef>
+                <a:spcPts val="600"/>
+              </a:spcBef>
+            </a:pPr>
+            <a:r>
+              <a:rPr lang="en-US" altLang="zh-TW" sz="800" dirty="0">
+                <a:latin typeface="Arial" panose="020B0604020202020204" pitchFamily="34" charset="0"/>
+                <a:cs typeface="Arial" panose="020B0604020202020204" pitchFamily="34" charset="0"/>
+              </a:rPr>
+              <a:t>Source </a:t>
+            </a:r>
+            <a:r>
+              <a:rPr lang="zh-TW" altLang="en-US" sz="800" dirty="0">
+                <a:latin typeface="Arial" panose="020B0604020202020204" pitchFamily="34" charset="0"/>
+                <a:cs typeface="Arial" panose="020B0604020202020204" pitchFamily="34" charset="0"/>
+              </a:rPr>
+              <a:t>：</a:t>
+            </a:r>
+            <a:r>
+              <a:rPr lang="en-CA" altLang="zh-TW" sz="800" dirty="0">
+                <a:latin typeface="Arial" panose="020B0604020202020204" pitchFamily="34" charset="0"/>
+                <a:cs typeface="Arial" panose="020B0604020202020204" pitchFamily="34" charset="0"/>
+              </a:rPr>
+              <a:t>FactSet, Equity Research Report, FS</a:t>
+            </a:r>
+            <a:endParaRPr lang="zh-CN" altLang="en-US" sz="800" dirty="0">
+              <a:latin typeface="Arial" panose="020B0604020202020204" pitchFamily="34" charset="0"/>
+              <a:cs typeface="Arial" panose="020B0604020202020204" pitchFamily="34" charset="0"/>
+            </a:endParaRPr>
+          </a:p>
+        </p:txBody>
+      </p:sp>
+      <p:sp>
+        <p:nvSpPr>
+          <p:cNvPr id="31" name="投影片編號版面配置區 3">
+            <a:extLst>
+              <a:ext uri="{FF2B5EF4-FFF2-40B4-BE49-F238E27FC236}">
+                <a16:creationId xmlns:a16="http://schemas.microsoft.com/office/drawing/2014/main" id="{C8391994-E840-45DD-9B76-C71BE2D0869D}"/>
+              </a:ext>
+            </a:extLst>
+          </p:cNvPr>
+          <p:cNvSpPr txBox="1">
+            <a:spLocks/>
+          </p:cNvSpPr>
+          <p:nvPr/>
+        </p:nvSpPr>
+        <p:spPr>
+          <a:xfrm>
+            <a:off x="524656" y="6356358"/>
+            <a:ext cx="2743200" cy="365125"/>
+          </a:xfrm>
+          <a:prstGeom prst="rect">
+            <a:avLst/>
+          </a:prstGeom>
+        </p:spPr>
+        <p:txBody>
+          <a:bodyPr vert="horz" lIns="91440" tIns="45720" rIns="91440" bIns="45720" rtlCol="0" anchor="ctr"/>
+          <a:lstStyle>
+            <a:defPPr>
+              <a:defRPr lang="en-US"/>
+            </a:defPPr>
+            <a:lvl1pPr marL="0" algn="l" defTabSz="914400" rtl="0" eaLnBrk="1" latinLnBrk="0" hangingPunct="1">
+              <a:defRPr sz="1000" b="0" i="0" kern="1200">
+                <a:solidFill>
+                  <a:schemeClr val="tx1">
+                    <a:tint val="75000"/>
+                  </a:schemeClr>
+                </a:solidFill>
+                <a:latin typeface="Microsoft YaHei" charset="-122"/>
+                <a:ea typeface="Microsoft YaHei" charset="-122"/>
+                <a:cs typeface="Microsoft YaHei" charset="-122"/>
+              </a:defRPr>
+            </a:lvl1pPr>
+            <a:lvl2pPr marL="457200" algn="l" defTabSz="914400" rtl="0" eaLnBrk="1" latinLnBrk="0" hangingPunct="1">
+              <a:defRPr sz="1800" kern="1200">
+                <a:solidFill>
+                  <a:schemeClr val="tx1"/>
+                </a:solidFill>
+                <a:latin typeface="+mn-lt"/>
+                <a:ea typeface="+mn-ea"/>
+                <a:cs typeface="+mn-cs"/>
+              </a:defRPr>
+            </a:lvl2pPr>
+            <a:lvl3pPr marL="914400" algn="l" defTabSz="914400" rtl="0" eaLnBrk="1" latinLnBrk="0" hangingPunct="1">
+              <a:defRPr sz="1800" kern="1200">
+                <a:solidFill>
+                  <a:schemeClr val="tx1"/>
+                </a:solidFill>
+                <a:latin typeface="+mn-lt"/>
+                <a:ea typeface="+mn-ea"/>
+                <a:cs typeface="+mn-cs"/>
+              </a:defRPr>
+            </a:lvl3pPr>
+            <a:lvl4pPr marL="1371600" algn="l" defTabSz="914400" rtl="0" eaLnBrk="1" latinLnBrk="0" hangingPunct="1">
+              <a:defRPr sz="1800" kern="1200">
+                <a:solidFill>
+                  <a:schemeClr val="tx1"/>
+                </a:solidFill>
+                <a:latin typeface="+mn-lt"/>
+                <a:ea typeface="+mn-ea"/>
+                <a:cs typeface="+mn-cs"/>
+              </a:defRPr>
+            </a:lvl4pPr>
+            <a:lvl5pPr marL="1828800" algn="l" defTabSz="914400" rtl="0" eaLnBrk="1" latinLnBrk="0" hangingPunct="1">
+              <a:defRPr sz="1800" kern="1200">
+                <a:solidFill>
+                  <a:schemeClr val="tx1"/>
+                </a:solidFill>
+                <a:latin typeface="+mn-lt"/>
+                <a:ea typeface="+mn-ea"/>
+                <a:cs typeface="+mn-cs"/>
+              </a:defRPr>
+            </a:lvl5pPr>
+            <a:lvl6pPr marL="2286000" algn="l" defTabSz="914400" rtl="0" eaLnBrk="1" latinLnBrk="0" hangingPunct="1">
+              <a:defRPr sz="1800" kern="1200">
+                <a:solidFill>
+                  <a:schemeClr val="tx1"/>
+                </a:solidFill>
+                <a:latin typeface="+mn-lt"/>
+                <a:ea typeface="+mn-ea"/>
+                <a:cs typeface="+mn-cs"/>
+              </a:defRPr>
+            </a:lvl6pPr>
+            <a:lvl7pPr marL="2743200" algn="l" defTabSz="914400" rtl="0" eaLnBrk="1" latinLnBrk="0" hangingPunct="1">
+              <a:defRPr sz="1800" kern="1200">
+                <a:solidFill>
+                  <a:schemeClr val="tx1"/>
+                </a:solidFill>
+                <a:latin typeface="+mn-lt"/>
+                <a:ea typeface="+mn-ea"/>
+                <a:cs typeface="+mn-cs"/>
+              </a:defRPr>
+            </a:lvl7pPr>
+            <a:lvl8pPr marL="3200400" algn="l" defTabSz="914400" rtl="0" eaLnBrk="1" latinLnBrk="0" hangingPunct="1">
+              <a:defRPr sz="1800" kern="1200">
+                <a:solidFill>
+                  <a:schemeClr val="tx1"/>
+                </a:solidFill>
+                <a:latin typeface="+mn-lt"/>
+                <a:ea typeface="+mn-ea"/>
+                <a:cs typeface="+mn-cs"/>
+              </a:defRPr>
+            </a:lvl8pPr>
+            <a:lvl9pPr marL="3657600" algn="l" defTabSz="914400" rtl="0" eaLnBrk="1" latinLnBrk="0" hangingPunct="1">
+              <a:defRPr sz="1800" kern="1200">
+                <a:solidFill>
+                  <a:schemeClr val="tx1"/>
+                </a:solidFill>
+                <a:latin typeface="+mn-lt"/>
+                <a:ea typeface="+mn-ea"/>
+                <a:cs typeface="+mn-cs"/>
+              </a:defRPr>
+            </a:lvl9pPr>
+          </a:lstStyle>
+          <a:p>
+            <a:fld id="{B7F7B65C-2824-9347-9C05-39D42996E2F4}" type="slidenum">
+              <a:rPr lang="fr-FR" smtClean="0"/>
+              <a:pPr/>
+              <a:t>3</a:t>
+            </a:fld>
+            <a:endParaRPr lang="fr-FR" dirty="0"/>
+          </a:p>
+        </p:txBody>
+      </p:sp>
+      <p:sp>
+        <p:nvSpPr>
+          <p:cNvPr id="11" name="文字方塊 10">
+            <a:extLst>
+              <a:ext uri="{FF2B5EF4-FFF2-40B4-BE49-F238E27FC236}">
+                <a16:creationId xmlns:a16="http://schemas.microsoft.com/office/drawing/2014/main" id="{EADD33A6-AEB8-4BDB-A429-9BFD587F7B73}"/>
+              </a:ext>
+            </a:extLst>
+          </p:cNvPr>
+          <p:cNvSpPr txBox="1"/>
+          <p:nvPr/>
+        </p:nvSpPr>
+        <p:spPr>
+          <a:xfrm>
+            <a:off x="6493805" y="1024493"/>
+            <a:ext cx="5544000" cy="272715"/>
           </a:xfrm>
           <a:prstGeom prst="rect">
             <a:avLst/>
@@ -2970,27 +4365,309 @@
           </a:lstStyle>
           <a:p>
             <a:r>
-              <a:rPr lang="en-CA" altLang="zh-CN" dirty="0"/>
-              <a:t>Some </a:t>
-            </a:r>
-            <a:r>
-              <a:rPr lang="en-CA" altLang="zh-CN" dirty="0" err="1"/>
-              <a:t>othe</a:t>
-            </a:r>
-            <a:r>
-              <a:rPr lang="en-CA" altLang="zh-CN" dirty="0"/>
-              <a:t> metric </a:t>
-            </a:r>
-            <a:endParaRPr lang="zh-CN" altLang="en-US" dirty="0"/>
-          </a:p>
-        </p:txBody>
-      </p:sp>
-      <p:sp>
-        <p:nvSpPr>
-          <p:cNvPr id="28" name="文字方塊 27">
+              <a:rPr lang="en-CA" altLang="zh-TW" dirty="0">
+                <a:sym typeface="Arial"/>
+              </a:rPr>
+              <a:t>Long-term Solvency</a:t>
+            </a:r>
+            <a:endParaRPr lang="zh-TW" altLang="en-US" dirty="0">
+              <a:sym typeface="Arial"/>
+            </a:endParaRPr>
+          </a:p>
+        </p:txBody>
+      </p:sp>
+      <p:grpSp>
+        <p:nvGrpSpPr>
+          <p:cNvPr id="28" name="群組 27">
             <a:extLst>
               <a:ext uri="{FF2B5EF4-FFF2-40B4-BE49-F238E27FC236}">
-                <a16:creationId xmlns:a16="http://schemas.microsoft.com/office/drawing/2014/main" id="{82130124-A902-4482-8E64-6546F78301B0}"/>
+                <a16:creationId xmlns:a16="http://schemas.microsoft.com/office/drawing/2014/main" id="{C3BFC9E2-940E-4AE4-BF20-FF01C51EC159}"/>
+              </a:ext>
+            </a:extLst>
+          </p:cNvPr>
+          <p:cNvGrpSpPr/>
+          <p:nvPr/>
+        </p:nvGrpSpPr>
+        <p:grpSpPr>
+          <a:xfrm>
+            <a:off x="213413" y="1468526"/>
+            <a:ext cx="6084444" cy="3371554"/>
+            <a:chOff x="592061" y="1457978"/>
+            <a:chExt cx="6037340" cy="3345452"/>
+          </a:xfrm>
+        </p:grpSpPr>
+        <p:pic>
+          <p:nvPicPr>
+            <p:cNvPr id="26" name="圖片 25">
+              <a:extLst>
+                <a:ext uri="{FF2B5EF4-FFF2-40B4-BE49-F238E27FC236}">
+                  <a16:creationId xmlns:a16="http://schemas.microsoft.com/office/drawing/2014/main" id="{8311DA05-7011-48E7-97C7-97592DF5D87B}"/>
+                </a:ext>
+              </a:extLst>
+            </p:cNvPr>
+            <p:cNvPicPr>
+              <a:picLocks noChangeAspect="1"/>
+            </p:cNvPicPr>
+            <p:nvPr/>
+          </p:nvPicPr>
+          <p:blipFill rotWithShape="1">
+            <a:blip r:embed="rId3"/>
+            <a:srcRect r="21415" b="4310"/>
+            <a:stretch/>
+          </p:blipFill>
+          <p:spPr>
+            <a:xfrm>
+              <a:off x="592061" y="1457978"/>
+              <a:ext cx="6037340" cy="3345452"/>
+            </a:xfrm>
+            <a:prstGeom prst="rect">
+              <a:avLst/>
+            </a:prstGeom>
+          </p:spPr>
+        </p:pic>
+        <p:pic>
+          <p:nvPicPr>
+            <p:cNvPr id="27" name="圖片 26">
+              <a:extLst>
+                <a:ext uri="{FF2B5EF4-FFF2-40B4-BE49-F238E27FC236}">
+                  <a16:creationId xmlns:a16="http://schemas.microsoft.com/office/drawing/2014/main" id="{BE0BCCE0-DF12-495A-BA52-FE93F5E6311C}"/>
+                </a:ext>
+              </a:extLst>
+            </p:cNvPr>
+            <p:cNvPicPr>
+              <a:picLocks noChangeAspect="1"/>
+            </p:cNvPicPr>
+            <p:nvPr/>
+          </p:nvPicPr>
+          <p:blipFill rotWithShape="1">
+            <a:blip r:embed="rId3"/>
+            <a:srcRect l="79462" t="56752" r="2900" b="18027"/>
+            <a:stretch/>
+          </p:blipFill>
+          <p:spPr>
+            <a:xfrm>
+              <a:off x="1448588" y="1917940"/>
+              <a:ext cx="1354960" cy="881744"/>
+            </a:xfrm>
+            <a:prstGeom prst="rect">
+              <a:avLst/>
+            </a:prstGeom>
+          </p:spPr>
+        </p:pic>
+      </p:grpSp>
+      <p:grpSp>
+        <p:nvGrpSpPr>
+          <p:cNvPr id="35" name="群組 34">
+            <a:extLst>
+              <a:ext uri="{FF2B5EF4-FFF2-40B4-BE49-F238E27FC236}">
+                <a16:creationId xmlns:a16="http://schemas.microsoft.com/office/drawing/2014/main" id="{7C4D9FDC-F3E8-44FD-AE66-87EBB3C0FA9B}"/>
+              </a:ext>
+            </a:extLst>
+          </p:cNvPr>
+          <p:cNvGrpSpPr/>
+          <p:nvPr/>
+        </p:nvGrpSpPr>
+        <p:grpSpPr>
+          <a:xfrm>
+            <a:off x="6237518" y="1512069"/>
+            <a:ext cx="5840663" cy="3523393"/>
+            <a:chOff x="6220708" y="1667303"/>
+            <a:chExt cx="5840663" cy="3523393"/>
+          </a:xfrm>
+        </p:grpSpPr>
+        <p:pic>
+          <p:nvPicPr>
+            <p:cNvPr id="24" name="圖片 23">
+              <a:extLst>
+                <a:ext uri="{FF2B5EF4-FFF2-40B4-BE49-F238E27FC236}">
+                  <a16:creationId xmlns:a16="http://schemas.microsoft.com/office/drawing/2014/main" id="{1F43C29D-FFD2-431E-9DFB-AB81D4AE6E18}"/>
+                </a:ext>
+              </a:extLst>
+            </p:cNvPr>
+            <p:cNvPicPr>
+              <a:picLocks noChangeAspect="1"/>
+            </p:cNvPicPr>
+            <p:nvPr/>
+          </p:nvPicPr>
+          <p:blipFill rotWithShape="1">
+            <a:blip r:embed="rId4"/>
+            <a:srcRect l="1599" r="23523"/>
+            <a:stretch/>
+          </p:blipFill>
+          <p:spPr>
+            <a:xfrm>
+              <a:off x="6220708" y="1667303"/>
+              <a:ext cx="5840663" cy="3523393"/>
+            </a:xfrm>
+            <a:prstGeom prst="rect">
+              <a:avLst/>
+            </a:prstGeom>
+          </p:spPr>
+        </p:pic>
+        <p:pic>
+          <p:nvPicPr>
+            <p:cNvPr id="33" name="圖片 32">
+              <a:extLst>
+                <a:ext uri="{FF2B5EF4-FFF2-40B4-BE49-F238E27FC236}">
+                  <a16:creationId xmlns:a16="http://schemas.microsoft.com/office/drawing/2014/main" id="{B0A75D24-C1D7-4D0A-B962-CE5519530ED8}"/>
+                </a:ext>
+              </a:extLst>
+            </p:cNvPr>
+            <p:cNvPicPr>
+              <a:picLocks noChangeAspect="1"/>
+            </p:cNvPicPr>
+            <p:nvPr/>
+          </p:nvPicPr>
+          <p:blipFill rotWithShape="1">
+            <a:blip r:embed="rId4"/>
+            <a:srcRect l="76645" t="57692" r="2142" b="17643"/>
+            <a:stretch/>
+          </p:blipFill>
+          <p:spPr>
+            <a:xfrm>
+              <a:off x="10297886" y="2100943"/>
+              <a:ext cx="1654628" cy="869067"/>
+            </a:xfrm>
+            <a:prstGeom prst="rect">
+              <a:avLst/>
+            </a:prstGeom>
+          </p:spPr>
+        </p:pic>
+      </p:grpSp>
+      <p:sp>
+        <p:nvSpPr>
+          <p:cNvPr id="37" name="矩形 36">
+            <a:extLst>
+              <a:ext uri="{FF2B5EF4-FFF2-40B4-BE49-F238E27FC236}">
+                <a16:creationId xmlns:a16="http://schemas.microsoft.com/office/drawing/2014/main" id="{B6F4B81A-F1D6-4BDD-BC5C-1CC8B61D59AF}"/>
+              </a:ext>
+            </a:extLst>
+          </p:cNvPr>
+          <p:cNvSpPr/>
+          <p:nvPr/>
+        </p:nvSpPr>
+        <p:spPr>
+          <a:xfrm>
+            <a:off x="789992" y="5054941"/>
+            <a:ext cx="5383327" cy="1114967"/>
+          </a:xfrm>
+          <a:prstGeom prst="rect">
+            <a:avLst/>
+          </a:prstGeom>
+        </p:spPr>
+        <p:style>
+          <a:lnRef idx="2">
+            <a:schemeClr val="accent1">
+              <a:shade val="50000"/>
+            </a:schemeClr>
+          </a:lnRef>
+          <a:fillRef idx="1">
+            <a:schemeClr val="accent1"/>
+          </a:fillRef>
+          <a:effectRef idx="0">
+            <a:schemeClr val="accent1"/>
+          </a:effectRef>
+          <a:fontRef idx="minor">
+            <a:schemeClr val="lt1"/>
+          </a:fontRef>
+        </p:style>
+        <p:txBody>
+          <a:bodyPr rtlCol="0" anchor="ctr"/>
+          <a:lstStyle/>
+          <a:p>
+            <a:pPr algn="ctr"/>
+            <a:r>
+              <a:rPr lang="en-CA" dirty="0"/>
+              <a:t>Description to be added</a:t>
+            </a:r>
+          </a:p>
+        </p:txBody>
+      </p:sp>
+      <p:sp>
+        <p:nvSpPr>
+          <p:cNvPr id="39" name="矩形 38">
+            <a:extLst>
+              <a:ext uri="{FF2B5EF4-FFF2-40B4-BE49-F238E27FC236}">
+                <a16:creationId xmlns:a16="http://schemas.microsoft.com/office/drawing/2014/main" id="{38B27D72-9BAF-4028-B409-10057C8C40A7}"/>
+              </a:ext>
+            </a:extLst>
+          </p:cNvPr>
+          <p:cNvSpPr/>
+          <p:nvPr/>
+        </p:nvSpPr>
+        <p:spPr>
+          <a:xfrm>
+            <a:off x="6654478" y="5035462"/>
+            <a:ext cx="5383327" cy="1114967"/>
+          </a:xfrm>
+          <a:prstGeom prst="rect">
+            <a:avLst/>
+          </a:prstGeom>
+        </p:spPr>
+        <p:style>
+          <a:lnRef idx="2">
+            <a:schemeClr val="accent1">
+              <a:shade val="50000"/>
+            </a:schemeClr>
+          </a:lnRef>
+          <a:fillRef idx="1">
+            <a:schemeClr val="accent1"/>
+          </a:fillRef>
+          <a:effectRef idx="0">
+            <a:schemeClr val="accent1"/>
+          </a:effectRef>
+          <a:fontRef idx="minor">
+            <a:schemeClr val="lt1"/>
+          </a:fontRef>
+        </p:style>
+        <p:txBody>
+          <a:bodyPr rtlCol="0" anchor="ctr"/>
+          <a:lstStyle/>
+          <a:p>
+            <a:pPr algn="ctr"/>
+            <a:r>
+              <a:rPr lang="en-CA" dirty="0"/>
+              <a:t>Description to be added</a:t>
+            </a:r>
+          </a:p>
+        </p:txBody>
+      </p:sp>
+    </p:spTree>
+    <p:extLst>
+      <p:ext uri="{BB962C8B-B14F-4D97-AF65-F5344CB8AC3E}">
+        <p14:creationId xmlns:p14="http://schemas.microsoft.com/office/powerpoint/2010/main" val="3164532101"/>
+      </p:ext>
+    </p:extLst>
+  </p:cSld>
+  <p:clrMapOvr>
+    <a:masterClrMapping/>
+  </p:clrMapOvr>
+</p:sld>
+</file>
+
+<file path=ppt/slides/slide4.xml><?xml version="1.0" encoding="utf-8"?>
+<p:sld xmlns:a="http://schemas.openxmlformats.org/drawingml/2006/main" xmlns:r="http://schemas.openxmlformats.org/officeDocument/2006/relationships" xmlns:p="http://schemas.openxmlformats.org/presentationml/2006/main">
+  <p:cSld>
+    <p:spTree>
+      <p:nvGrpSpPr>
+        <p:cNvPr id="1" name=""/>
+        <p:cNvGrpSpPr/>
+        <p:nvPr/>
+      </p:nvGrpSpPr>
+      <p:grpSpPr>
+        <a:xfrm>
+          <a:off x="0" y="0"/>
+          <a:ext cx="0" cy="0"/>
+          <a:chOff x="0" y="0"/>
+          <a:chExt cx="0" cy="0"/>
+        </a:xfrm>
+      </p:grpSpPr>
+      <p:sp>
+        <p:nvSpPr>
+          <p:cNvPr id="3" name="文字方塊 2">
+            <a:extLst>
+              <a:ext uri="{FF2B5EF4-FFF2-40B4-BE49-F238E27FC236}">
+                <a16:creationId xmlns:a16="http://schemas.microsoft.com/office/drawing/2014/main" id="{7923D636-BB03-4AD4-820E-D92AA8F7E7C2}"/>
               </a:ext>
             </a:extLst>
           </p:cNvPr>
@@ -2999,8 +4676,8 @@
         </p:nvSpPr>
         <p:spPr>
           <a:xfrm>
-            <a:off x="4359899" y="1024493"/>
-            <a:ext cx="3528000" cy="272715"/>
+            <a:off x="709656" y="1024493"/>
+            <a:ext cx="8568000" cy="279928"/>
           </a:xfrm>
           <a:prstGeom prst="rect">
             <a:avLst/>
@@ -3130,17 +4807,237 @@
           <a:p>
             <a:r>
               <a:rPr lang="en-CA" altLang="zh-CN" dirty="0"/>
-              <a:t>Capex</a:t>
-            </a:r>
-          </a:p>
-        </p:txBody>
-      </p:sp>
-      <p:sp>
-        <p:nvSpPr>
-          <p:cNvPr id="30" name="文字方塊 29">
+              <a:t>First Tier Company - TSLA</a:t>
+            </a:r>
+          </a:p>
+        </p:txBody>
+      </p:sp>
+      <p:sp>
+        <p:nvSpPr>
+          <p:cNvPr id="2" name="標題 1">
             <a:extLst>
               <a:ext uri="{FF2B5EF4-FFF2-40B4-BE49-F238E27FC236}">
-                <a16:creationId xmlns:a16="http://schemas.microsoft.com/office/drawing/2014/main" id="{06C038A2-8E05-4238-849A-4CF19C45BFC3}"/>
+                <a16:creationId xmlns:a16="http://schemas.microsoft.com/office/drawing/2014/main" id="{C9446F86-451E-40FA-88C7-B9BA2C8DDCDA}"/>
+              </a:ext>
+            </a:extLst>
+          </p:cNvPr>
+          <p:cNvSpPr>
+            <a:spLocks noGrp="1"/>
+          </p:cNvSpPr>
+          <p:nvPr>
+            <p:ph type="title"/>
+          </p:nvPr>
+        </p:nvSpPr>
+        <p:spPr/>
+        <p:txBody>
+          <a:bodyPr>
+            <a:normAutofit fontScale="90000"/>
+          </a:bodyPr>
+          <a:lstStyle/>
+          <a:p>
+            <a:r>
+              <a:rPr lang="en-CA" altLang="zh-TW" sz="2200" dirty="0">
+                <a:latin typeface="+mj-lt"/>
+              </a:rPr>
+              <a:t>TSLA-</a:t>
+            </a:r>
+            <a:r>
+              <a:rPr lang="zh-TW" altLang="en-US" sz="2200" dirty="0">
+                <a:latin typeface="+mj-lt"/>
+              </a:rPr>
+              <a:t> </a:t>
+            </a:r>
+            <a:r>
+              <a:rPr lang="en-CA" altLang="zh-TW" dirty="0">
+                <a:latin typeface="+mj-lt"/>
+              </a:rPr>
+              <a:t>Competitive</a:t>
+            </a:r>
+            <a:r>
+              <a:rPr lang="en-CA" altLang="zh-TW" sz="2200" dirty="0">
+                <a:latin typeface="+mj-lt"/>
+              </a:rPr>
+              <a:t> Landscape</a:t>
+            </a:r>
+            <a:br>
+              <a:rPr lang="en-CA" altLang="zh-TW" sz="2200" dirty="0">
+                <a:latin typeface="+mj-lt"/>
+              </a:rPr>
+            </a:br>
+            <a:endParaRPr lang="en-CA" sz="2200" dirty="0">
+              <a:latin typeface="+mj-lt"/>
+            </a:endParaRPr>
+          </a:p>
+        </p:txBody>
+      </p:sp>
+      <p:sp>
+        <p:nvSpPr>
+          <p:cNvPr id="31" name="投影片編號版面配置區 3">
+            <a:extLst>
+              <a:ext uri="{FF2B5EF4-FFF2-40B4-BE49-F238E27FC236}">
+                <a16:creationId xmlns:a16="http://schemas.microsoft.com/office/drawing/2014/main" id="{C8391994-E840-45DD-9B76-C71BE2D0869D}"/>
+              </a:ext>
+            </a:extLst>
+          </p:cNvPr>
+          <p:cNvSpPr txBox="1">
+            <a:spLocks/>
+          </p:cNvSpPr>
+          <p:nvPr/>
+        </p:nvSpPr>
+        <p:spPr>
+          <a:xfrm>
+            <a:off x="524656" y="6356358"/>
+            <a:ext cx="2743200" cy="365125"/>
+          </a:xfrm>
+          <a:prstGeom prst="rect">
+            <a:avLst/>
+          </a:prstGeom>
+        </p:spPr>
+        <p:txBody>
+          <a:bodyPr vert="horz" lIns="91440" tIns="45720" rIns="91440" bIns="45720" rtlCol="0" anchor="ctr"/>
+          <a:lstStyle>
+            <a:defPPr>
+              <a:defRPr lang="en-US"/>
+            </a:defPPr>
+            <a:lvl1pPr marL="0" algn="l" defTabSz="914400" rtl="0" eaLnBrk="1" latinLnBrk="0" hangingPunct="1">
+              <a:defRPr sz="1000" b="0" i="0" kern="1200">
+                <a:solidFill>
+                  <a:schemeClr val="tx1">
+                    <a:tint val="75000"/>
+                  </a:schemeClr>
+                </a:solidFill>
+                <a:latin typeface="Microsoft YaHei" charset="-122"/>
+                <a:ea typeface="Microsoft YaHei" charset="-122"/>
+                <a:cs typeface="Microsoft YaHei" charset="-122"/>
+              </a:defRPr>
+            </a:lvl1pPr>
+            <a:lvl2pPr marL="457200" algn="l" defTabSz="914400" rtl="0" eaLnBrk="1" latinLnBrk="0" hangingPunct="1">
+              <a:defRPr sz="1800" kern="1200">
+                <a:solidFill>
+                  <a:schemeClr val="tx1"/>
+                </a:solidFill>
+                <a:latin typeface="+mn-lt"/>
+                <a:ea typeface="+mn-ea"/>
+                <a:cs typeface="+mn-cs"/>
+              </a:defRPr>
+            </a:lvl2pPr>
+            <a:lvl3pPr marL="914400" algn="l" defTabSz="914400" rtl="0" eaLnBrk="1" latinLnBrk="0" hangingPunct="1">
+              <a:defRPr sz="1800" kern="1200">
+                <a:solidFill>
+                  <a:schemeClr val="tx1"/>
+                </a:solidFill>
+                <a:latin typeface="+mn-lt"/>
+                <a:ea typeface="+mn-ea"/>
+                <a:cs typeface="+mn-cs"/>
+              </a:defRPr>
+            </a:lvl3pPr>
+            <a:lvl4pPr marL="1371600" algn="l" defTabSz="914400" rtl="0" eaLnBrk="1" latinLnBrk="0" hangingPunct="1">
+              <a:defRPr sz="1800" kern="1200">
+                <a:solidFill>
+                  <a:schemeClr val="tx1"/>
+                </a:solidFill>
+                <a:latin typeface="+mn-lt"/>
+                <a:ea typeface="+mn-ea"/>
+                <a:cs typeface="+mn-cs"/>
+              </a:defRPr>
+            </a:lvl4pPr>
+            <a:lvl5pPr marL="1828800" algn="l" defTabSz="914400" rtl="0" eaLnBrk="1" latinLnBrk="0" hangingPunct="1">
+              <a:defRPr sz="1800" kern="1200">
+                <a:solidFill>
+                  <a:schemeClr val="tx1"/>
+                </a:solidFill>
+                <a:latin typeface="+mn-lt"/>
+                <a:ea typeface="+mn-ea"/>
+                <a:cs typeface="+mn-cs"/>
+              </a:defRPr>
+            </a:lvl5pPr>
+            <a:lvl6pPr marL="2286000" algn="l" defTabSz="914400" rtl="0" eaLnBrk="1" latinLnBrk="0" hangingPunct="1">
+              <a:defRPr sz="1800" kern="1200">
+                <a:solidFill>
+                  <a:schemeClr val="tx1"/>
+                </a:solidFill>
+                <a:latin typeface="+mn-lt"/>
+                <a:ea typeface="+mn-ea"/>
+                <a:cs typeface="+mn-cs"/>
+              </a:defRPr>
+            </a:lvl6pPr>
+            <a:lvl7pPr marL="2743200" algn="l" defTabSz="914400" rtl="0" eaLnBrk="1" latinLnBrk="0" hangingPunct="1">
+              <a:defRPr sz="1800" kern="1200">
+                <a:solidFill>
+                  <a:schemeClr val="tx1"/>
+                </a:solidFill>
+                <a:latin typeface="+mn-lt"/>
+                <a:ea typeface="+mn-ea"/>
+                <a:cs typeface="+mn-cs"/>
+              </a:defRPr>
+            </a:lvl7pPr>
+            <a:lvl8pPr marL="3200400" algn="l" defTabSz="914400" rtl="0" eaLnBrk="1" latinLnBrk="0" hangingPunct="1">
+              <a:defRPr sz="1800" kern="1200">
+                <a:solidFill>
+                  <a:schemeClr val="tx1"/>
+                </a:solidFill>
+                <a:latin typeface="+mn-lt"/>
+                <a:ea typeface="+mn-ea"/>
+                <a:cs typeface="+mn-cs"/>
+              </a:defRPr>
+            </a:lvl8pPr>
+            <a:lvl9pPr marL="3657600" algn="l" defTabSz="914400" rtl="0" eaLnBrk="1" latinLnBrk="0" hangingPunct="1">
+              <a:defRPr sz="1800" kern="1200">
+                <a:solidFill>
+                  <a:schemeClr val="tx1"/>
+                </a:solidFill>
+                <a:latin typeface="+mn-lt"/>
+                <a:ea typeface="+mn-ea"/>
+                <a:cs typeface="+mn-cs"/>
+              </a:defRPr>
+            </a:lvl9pPr>
+          </a:lstStyle>
+          <a:p>
+            <a:fld id="{B7F7B65C-2824-9347-9C05-39D42996E2F4}" type="slidenum">
+              <a:rPr lang="fr-FR" smtClean="0"/>
+              <a:pPr/>
+              <a:t>4</a:t>
+            </a:fld>
+            <a:endParaRPr lang="fr-FR" dirty="0"/>
+          </a:p>
+        </p:txBody>
+      </p:sp>
+      <p:pic>
+        <p:nvPicPr>
+          <p:cNvPr id="8" name="圖片 7">
+            <a:extLst>
+              <a:ext uri="{FF2B5EF4-FFF2-40B4-BE49-F238E27FC236}">
+                <a16:creationId xmlns:a16="http://schemas.microsoft.com/office/drawing/2014/main" id="{E75D76B4-47C2-4036-A2D4-D60C7D000682}"/>
+              </a:ext>
+            </a:extLst>
+          </p:cNvPr>
+          <p:cNvPicPr>
+            <a:picLocks noChangeAspect="1"/>
+          </p:cNvPicPr>
+          <p:nvPr/>
+        </p:nvPicPr>
+        <p:blipFill>
+          <a:blip r:embed="rId3"/>
+          <a:stretch>
+            <a:fillRect/>
+          </a:stretch>
+        </p:blipFill>
+        <p:spPr>
+          <a:xfrm>
+            <a:off x="524656" y="1372367"/>
+            <a:ext cx="9048750" cy="5334000"/>
+          </a:xfrm>
+          <a:prstGeom prst="rect">
+            <a:avLst/>
+          </a:prstGeom>
+        </p:spPr>
+      </p:pic>
+      <p:sp>
+        <p:nvSpPr>
+          <p:cNvPr id="9" name="文字方塊 8">
+            <a:extLst>
+              <a:ext uri="{FF2B5EF4-FFF2-40B4-BE49-F238E27FC236}">
+                <a16:creationId xmlns:a16="http://schemas.microsoft.com/office/drawing/2014/main" id="{17476CB7-4E3F-4A2A-AC3A-798588DE9927}"/>
               </a:ext>
             </a:extLst>
           </p:cNvPr>
@@ -3149,8 +5046,8 @@
         </p:nvSpPr>
         <p:spPr>
           <a:xfrm>
-            <a:off x="8010142" y="1024493"/>
-            <a:ext cx="3528000" cy="272715"/>
+            <a:off x="9459646" y="1024493"/>
+            <a:ext cx="2520000" cy="279928"/>
           </a:xfrm>
           <a:prstGeom prst="rect">
             <a:avLst/>
@@ -3280,17 +5177,17 @@
           <a:p>
             <a:r>
               <a:rPr lang="en-CA" altLang="zh-CN" dirty="0"/>
-              <a:t>Profitability</a:t>
-            </a:r>
-          </a:p>
-        </p:txBody>
-      </p:sp>
-      <p:sp>
-        <p:nvSpPr>
-          <p:cNvPr id="12" name="文本框 90">
+              <a:t>Selected Competitors</a:t>
+            </a:r>
+          </a:p>
+        </p:txBody>
+      </p:sp>
+      <p:sp>
+        <p:nvSpPr>
+          <p:cNvPr id="15" name="文字方塊 14">
             <a:extLst>
               <a:ext uri="{FF2B5EF4-FFF2-40B4-BE49-F238E27FC236}">
-                <a16:creationId xmlns:a16="http://schemas.microsoft.com/office/drawing/2014/main" id="{8803F9D3-57BD-4F87-9B87-0C5D590B7B31}"/>
+                <a16:creationId xmlns:a16="http://schemas.microsoft.com/office/drawing/2014/main" id="{7C5F4643-2BB7-4D0B-9477-6B249D2A108B}"/>
               </a:ext>
             </a:extLst>
           </p:cNvPr>
@@ -3299,12 +5196,13 @@
         </p:nvSpPr>
         <p:spPr>
           <a:xfrm>
-            <a:off x="914530" y="6420618"/>
-            <a:ext cx="5209371" cy="395749"/>
+            <a:off x="9459646" y="1499976"/>
+            <a:ext cx="2618594" cy="2031325"/>
           </a:xfrm>
           <a:prstGeom prst="rect">
             <a:avLst/>
           </a:prstGeom>
+          <a:noFill/>
         </p:spPr>
         <p:txBody>
           <a:bodyPr wrap="square" rtlCol="0">
@@ -3312,286 +5210,112 @@
           </a:bodyPr>
           <a:lstStyle/>
           <a:p>
-            <a:pPr>
-              <a:lnSpc>
-                <a:spcPct val="130000"/>
-              </a:lnSpc>
-              <a:spcBef>
-                <a:spcPts val="600"/>
-              </a:spcBef>
+            <a:pPr marL="285750" indent="-285750">
+              <a:buFont typeface="Arial" panose="020B0604020202020204" pitchFamily="34" charset="0"/>
+              <a:buChar char="•"/>
+              <a:defRPr/>
             </a:pPr>
             <a:r>
-              <a:rPr lang="en-US" altLang="zh-TW" sz="800" dirty="0">
-                <a:latin typeface="Arial" panose="020B0604020202020204" pitchFamily="34" charset="0"/>
-                <a:cs typeface="Arial" panose="020B0604020202020204" pitchFamily="34" charset="0"/>
-              </a:rPr>
-              <a:t>Source </a:t>
-            </a:r>
-            <a:r>
-              <a:rPr lang="zh-TW" altLang="en-US" sz="800" dirty="0">
-                <a:latin typeface="Arial" panose="020B0604020202020204" pitchFamily="34" charset="0"/>
-                <a:cs typeface="Arial" panose="020B0604020202020204" pitchFamily="34" charset="0"/>
-              </a:rPr>
-              <a:t>：</a:t>
-            </a:r>
-            <a:r>
-              <a:rPr lang="en-CA" altLang="zh-TW" sz="800" dirty="0" err="1">
-                <a:latin typeface="Arial" panose="020B0604020202020204" pitchFamily="34" charset="0"/>
-                <a:cs typeface="Arial" panose="020B0604020202020204" pitchFamily="34" charset="0"/>
-              </a:rPr>
-              <a:t>Factset</a:t>
-            </a:r>
-            <a:r>
-              <a:rPr lang="en-CA" altLang="zh-TW" sz="800" dirty="0">
-                <a:latin typeface="Arial" panose="020B0604020202020204" pitchFamily="34" charset="0"/>
-                <a:cs typeface="Arial" panose="020B0604020202020204" pitchFamily="34" charset="0"/>
-              </a:rPr>
-              <a:t>, Equity Research Report, FS. Note 1, adjusted EBITDA = EBITDA </a:t>
-            </a:r>
-            <a:r>
-              <a:rPr lang="en-CA" sz="800" dirty="0"/>
-              <a:t>excludes share based payments</a:t>
-            </a:r>
-            <a:endParaRPr lang="zh-CN" altLang="en-US" sz="800" dirty="0">
-              <a:latin typeface="Arial" panose="020B0604020202020204" pitchFamily="34" charset="0"/>
-              <a:cs typeface="Arial" panose="020B0604020202020204" pitchFamily="34" charset="0"/>
-            </a:endParaRPr>
-          </a:p>
-        </p:txBody>
-      </p:sp>
-      <p:sp>
-        <p:nvSpPr>
-          <p:cNvPr id="31" name="投影片編號版面配置區 3">
+              <a:rPr lang="en-CA" sz="1400" dirty="0"/>
+              <a:t>General Motors Company  </a:t>
+            </a:r>
+          </a:p>
+          <a:p>
+            <a:pPr marL="285750" indent="-285750">
+              <a:buFont typeface="Arial" panose="020B0604020202020204" pitchFamily="34" charset="0"/>
+              <a:buChar char="•"/>
+              <a:defRPr/>
+            </a:pPr>
+            <a:r>
+              <a:rPr lang="en-CA" sz="1400" dirty="0"/>
+              <a:t>Ford Motor Company   </a:t>
+            </a:r>
+          </a:p>
+          <a:p>
+            <a:pPr marL="285750" indent="-285750">
+              <a:buFont typeface="Arial" panose="020B0604020202020204" pitchFamily="34" charset="0"/>
+              <a:buChar char="•"/>
+              <a:defRPr/>
+            </a:pPr>
+            <a:r>
+              <a:rPr lang="en-CA" sz="1400" dirty="0"/>
+              <a:t>BAIC Motor Corporation</a:t>
+            </a:r>
+          </a:p>
+          <a:p>
+            <a:pPr marL="285750" indent="-285750">
+              <a:buFont typeface="Arial" panose="020B0604020202020204" pitchFamily="34" charset="0"/>
+              <a:buChar char="•"/>
+              <a:defRPr/>
+            </a:pPr>
+            <a:r>
+              <a:rPr lang="en-CA" sz="1400" dirty="0"/>
+              <a:t>Aptiv PLC </a:t>
+            </a:r>
+          </a:p>
+          <a:p>
+            <a:pPr marL="285750" indent="-285750">
+              <a:buFont typeface="Arial" panose="020B0604020202020204" pitchFamily="34" charset="0"/>
+              <a:buChar char="•"/>
+              <a:defRPr/>
+            </a:pPr>
+            <a:r>
+              <a:rPr lang="en-CA" sz="1400" dirty="0"/>
+              <a:t>BYD Company </a:t>
+            </a:r>
+          </a:p>
+          <a:p>
+            <a:pPr marL="285750" indent="-285750">
+              <a:buFont typeface="Arial" panose="020B0604020202020204" pitchFamily="34" charset="0"/>
+              <a:buChar char="•"/>
+              <a:defRPr/>
+            </a:pPr>
+            <a:r>
+              <a:rPr lang="en-CA" sz="1400" dirty="0"/>
+              <a:t>Great Wall Motor Company</a:t>
+            </a:r>
+          </a:p>
+          <a:p>
+            <a:pPr marL="285750" indent="-285750">
+              <a:buFont typeface="Arial" panose="020B0604020202020204" pitchFamily="34" charset="0"/>
+              <a:buChar char="•"/>
+              <a:defRPr/>
+            </a:pPr>
+            <a:r>
+              <a:rPr lang="en-CA" sz="1400" dirty="0"/>
+              <a:t>Isuzu Motors </a:t>
+            </a:r>
+          </a:p>
+          <a:p>
+            <a:pPr marL="285750" indent="-285750">
+              <a:buFont typeface="Arial" panose="020B0604020202020204" pitchFamily="34" charset="0"/>
+              <a:buChar char="•"/>
+              <a:defRPr/>
+            </a:pPr>
+            <a:r>
+              <a:rPr lang="en-CA" sz="1400" dirty="0"/>
+              <a:t>AUDI AG  </a:t>
+            </a:r>
+          </a:p>
+          <a:p>
+            <a:pPr marL="285750" indent="-285750">
+              <a:buFont typeface="Arial" panose="020B0604020202020204" pitchFamily="34" charset="0"/>
+              <a:buChar char="•"/>
+              <a:defRPr/>
+            </a:pPr>
+            <a:r>
+              <a:rPr lang="en-CA" sz="1400" dirty="0"/>
+              <a:t>Tata Motors</a:t>
+            </a:r>
+          </a:p>
+        </p:txBody>
+      </p:sp>
+      <p:sp>
+        <p:nvSpPr>
+          <p:cNvPr id="16" name="文字方塊 15">
             <a:extLst>
               <a:ext uri="{FF2B5EF4-FFF2-40B4-BE49-F238E27FC236}">
-                <a16:creationId xmlns:a16="http://schemas.microsoft.com/office/drawing/2014/main" id="{C8391994-E840-45DD-9B76-C71BE2D0869D}"/>
-              </a:ext>
-            </a:extLst>
-          </p:cNvPr>
-          <p:cNvSpPr txBox="1">
-            <a:spLocks/>
-          </p:cNvSpPr>
-          <p:nvPr/>
-        </p:nvSpPr>
-        <p:spPr>
-          <a:xfrm>
-            <a:off x="524656" y="6356358"/>
-            <a:ext cx="2743200" cy="365125"/>
-          </a:xfrm>
-          <a:prstGeom prst="rect">
-            <a:avLst/>
-          </a:prstGeom>
-        </p:spPr>
-        <p:txBody>
-          <a:bodyPr vert="horz" lIns="91440" tIns="45720" rIns="91440" bIns="45720" rtlCol="0" anchor="ctr"/>
-          <a:lstStyle>
-            <a:defPPr>
-              <a:defRPr lang="en-US"/>
-            </a:defPPr>
-            <a:lvl1pPr marL="0" algn="l" defTabSz="914400" rtl="0" eaLnBrk="1" latinLnBrk="0" hangingPunct="1">
-              <a:defRPr sz="1000" b="0" i="0" kern="1200">
-                <a:solidFill>
-                  <a:schemeClr val="tx1">
-                    <a:tint val="75000"/>
-                  </a:schemeClr>
-                </a:solidFill>
-                <a:latin typeface="Microsoft YaHei" charset="-122"/>
-                <a:ea typeface="Microsoft YaHei" charset="-122"/>
-                <a:cs typeface="Microsoft YaHei" charset="-122"/>
-              </a:defRPr>
-            </a:lvl1pPr>
-            <a:lvl2pPr marL="457200" algn="l" defTabSz="914400" rtl="0" eaLnBrk="1" latinLnBrk="0" hangingPunct="1">
-              <a:defRPr sz="1800" kern="1200">
-                <a:solidFill>
-                  <a:schemeClr val="tx1"/>
-                </a:solidFill>
-                <a:latin typeface="+mn-lt"/>
-                <a:ea typeface="+mn-ea"/>
-                <a:cs typeface="+mn-cs"/>
-              </a:defRPr>
-            </a:lvl2pPr>
-            <a:lvl3pPr marL="914400" algn="l" defTabSz="914400" rtl="0" eaLnBrk="1" latinLnBrk="0" hangingPunct="1">
-              <a:defRPr sz="1800" kern="1200">
-                <a:solidFill>
-                  <a:schemeClr val="tx1"/>
-                </a:solidFill>
-                <a:latin typeface="+mn-lt"/>
-                <a:ea typeface="+mn-ea"/>
-                <a:cs typeface="+mn-cs"/>
-              </a:defRPr>
-            </a:lvl3pPr>
-            <a:lvl4pPr marL="1371600" algn="l" defTabSz="914400" rtl="0" eaLnBrk="1" latinLnBrk="0" hangingPunct="1">
-              <a:defRPr sz="1800" kern="1200">
-                <a:solidFill>
-                  <a:schemeClr val="tx1"/>
-                </a:solidFill>
-                <a:latin typeface="+mn-lt"/>
-                <a:ea typeface="+mn-ea"/>
-                <a:cs typeface="+mn-cs"/>
-              </a:defRPr>
-            </a:lvl4pPr>
-            <a:lvl5pPr marL="1828800" algn="l" defTabSz="914400" rtl="0" eaLnBrk="1" latinLnBrk="0" hangingPunct="1">
-              <a:defRPr sz="1800" kern="1200">
-                <a:solidFill>
-                  <a:schemeClr val="tx1"/>
-                </a:solidFill>
-                <a:latin typeface="+mn-lt"/>
-                <a:ea typeface="+mn-ea"/>
-                <a:cs typeface="+mn-cs"/>
-              </a:defRPr>
-            </a:lvl5pPr>
-            <a:lvl6pPr marL="2286000" algn="l" defTabSz="914400" rtl="0" eaLnBrk="1" latinLnBrk="0" hangingPunct="1">
-              <a:defRPr sz="1800" kern="1200">
-                <a:solidFill>
-                  <a:schemeClr val="tx1"/>
-                </a:solidFill>
-                <a:latin typeface="+mn-lt"/>
-                <a:ea typeface="+mn-ea"/>
-                <a:cs typeface="+mn-cs"/>
-              </a:defRPr>
-            </a:lvl6pPr>
-            <a:lvl7pPr marL="2743200" algn="l" defTabSz="914400" rtl="0" eaLnBrk="1" latinLnBrk="0" hangingPunct="1">
-              <a:defRPr sz="1800" kern="1200">
-                <a:solidFill>
-                  <a:schemeClr val="tx1"/>
-                </a:solidFill>
-                <a:latin typeface="+mn-lt"/>
-                <a:ea typeface="+mn-ea"/>
-                <a:cs typeface="+mn-cs"/>
-              </a:defRPr>
-            </a:lvl7pPr>
-            <a:lvl8pPr marL="3200400" algn="l" defTabSz="914400" rtl="0" eaLnBrk="1" latinLnBrk="0" hangingPunct="1">
-              <a:defRPr sz="1800" kern="1200">
-                <a:solidFill>
-                  <a:schemeClr val="tx1"/>
-                </a:solidFill>
-                <a:latin typeface="+mn-lt"/>
-                <a:ea typeface="+mn-ea"/>
-                <a:cs typeface="+mn-cs"/>
-              </a:defRPr>
-            </a:lvl8pPr>
-            <a:lvl9pPr marL="3657600" algn="l" defTabSz="914400" rtl="0" eaLnBrk="1" latinLnBrk="0" hangingPunct="1">
-              <a:defRPr sz="1800" kern="1200">
-                <a:solidFill>
-                  <a:schemeClr val="tx1"/>
-                </a:solidFill>
-                <a:latin typeface="+mn-lt"/>
-                <a:ea typeface="+mn-ea"/>
-                <a:cs typeface="+mn-cs"/>
-              </a:defRPr>
-            </a:lvl9pPr>
-          </a:lstStyle>
-          <a:p>
-            <a:fld id="{B7F7B65C-2824-9347-9C05-39D42996E2F4}" type="slidenum">
-              <a:rPr lang="fr-FR" smtClean="0"/>
-              <a:pPr/>
-              <a:t>2</a:t>
-            </a:fld>
-            <a:endParaRPr lang="fr-FR" dirty="0"/>
-          </a:p>
-        </p:txBody>
-      </p:sp>
-    </p:spTree>
-    <p:extLst>
-      <p:ext uri="{BB962C8B-B14F-4D97-AF65-F5344CB8AC3E}">
-        <p14:creationId xmlns:p14="http://schemas.microsoft.com/office/powerpoint/2010/main" val="589510143"/>
-      </p:ext>
-    </p:extLst>
-  </p:cSld>
-  <p:clrMapOvr>
-    <a:masterClrMapping/>
-  </p:clrMapOvr>
-</p:sld>
-</file>
-
-<file path=ppt/slides/slide3.xml><?xml version="1.0" encoding="utf-8"?>
-<p:sld xmlns:a="http://schemas.openxmlformats.org/drawingml/2006/main" xmlns:r="http://schemas.openxmlformats.org/officeDocument/2006/relationships" xmlns:p="http://schemas.openxmlformats.org/presentationml/2006/main">
-  <p:cSld>
-    <p:spTree>
-      <p:nvGrpSpPr>
-        <p:cNvPr id="1" name=""/>
-        <p:cNvGrpSpPr/>
-        <p:nvPr/>
-      </p:nvGrpSpPr>
-      <p:grpSpPr>
-        <a:xfrm>
-          <a:off x="0" y="0"/>
-          <a:ext cx="0" cy="0"/>
-          <a:chOff x="0" y="0"/>
-          <a:chExt cx="0" cy="0"/>
-        </a:xfrm>
-      </p:grpSpPr>
-      <p:pic>
-        <p:nvPicPr>
-          <p:cNvPr id="4" name="圖片 3">
-            <a:extLst>
-              <a:ext uri="{FF2B5EF4-FFF2-40B4-BE49-F238E27FC236}">
-                <a16:creationId xmlns:a16="http://schemas.microsoft.com/office/drawing/2014/main" id="{15479745-C053-410E-879B-656B15F11D9E}"/>
-              </a:ext>
-            </a:extLst>
-          </p:cNvPr>
-          <p:cNvPicPr>
-            <a:picLocks noChangeAspect="1"/>
-          </p:cNvPicPr>
-          <p:nvPr/>
-        </p:nvPicPr>
-        <p:blipFill>
-          <a:blip r:embed="rId3"/>
-          <a:stretch>
-            <a:fillRect/>
-          </a:stretch>
-        </p:blipFill>
-        <p:spPr>
-          <a:xfrm>
-            <a:off x="653858" y="1418342"/>
-            <a:ext cx="6578349" cy="6578349"/>
-          </a:xfrm>
-          <a:prstGeom prst="rect">
-            <a:avLst/>
-          </a:prstGeom>
-        </p:spPr>
-      </p:pic>
-      <p:sp>
-        <p:nvSpPr>
-          <p:cNvPr id="2" name="標題 1">
-            <a:extLst>
-              <a:ext uri="{FF2B5EF4-FFF2-40B4-BE49-F238E27FC236}">
-                <a16:creationId xmlns:a16="http://schemas.microsoft.com/office/drawing/2014/main" id="{C9446F86-451E-40FA-88C7-B9BA2C8DDCDA}"/>
-              </a:ext>
-            </a:extLst>
-          </p:cNvPr>
-          <p:cNvSpPr>
-            <a:spLocks noGrp="1"/>
-          </p:cNvSpPr>
-          <p:nvPr>
-            <p:ph type="title"/>
-          </p:nvPr>
-        </p:nvSpPr>
-        <p:spPr/>
-        <p:txBody>
-          <a:bodyPr>
-            <a:normAutofit/>
-          </a:bodyPr>
-          <a:lstStyle/>
-          <a:p>
-            <a:r>
-              <a:rPr lang="en-CA" altLang="zh-TW" sz="2200" dirty="0">
-                <a:latin typeface="+mj-lt"/>
-              </a:rPr>
-              <a:t>TSLA-Financial Analysis </a:t>
-            </a:r>
-            <a:endParaRPr lang="en-CA" sz="2200" dirty="0">
-              <a:latin typeface="+mj-lt"/>
-            </a:endParaRPr>
-          </a:p>
-        </p:txBody>
-      </p:sp>
-      <p:sp>
-        <p:nvSpPr>
-          <p:cNvPr id="6" name="文字方塊 5">
-            <a:extLst>
-              <a:ext uri="{FF2B5EF4-FFF2-40B4-BE49-F238E27FC236}">
-                <a16:creationId xmlns:a16="http://schemas.microsoft.com/office/drawing/2014/main" id="{046C4879-DB76-4C9D-9EBD-A8E62ABEDFFF}"/>
+                <a16:creationId xmlns:a16="http://schemas.microsoft.com/office/drawing/2014/main" id="{8EF053D4-C45B-4DB6-A34C-AA3074AA104C}"/>
               </a:ext>
             </a:extLst>
           </p:cNvPr>
@@ -3600,8 +5324,8 @@
         </p:nvSpPr>
         <p:spPr>
           <a:xfrm>
-            <a:off x="709656" y="1024493"/>
-            <a:ext cx="3528000" cy="272715"/>
+            <a:off x="9459646" y="3899403"/>
+            <a:ext cx="2520000" cy="279928"/>
           </a:xfrm>
           <a:prstGeom prst="rect">
             <a:avLst/>
@@ -3731,8 +5455,337 @@
           <a:p>
             <a:r>
               <a:rPr lang="en-CA" altLang="zh-CN" dirty="0"/>
-              <a:t>Revenue</a:t>
-            </a:r>
+              <a:t>Highlights</a:t>
+            </a:r>
+          </a:p>
+        </p:txBody>
+      </p:sp>
+      <p:sp>
+        <p:nvSpPr>
+          <p:cNvPr id="18" name="文字方塊 17">
+            <a:extLst>
+              <a:ext uri="{FF2B5EF4-FFF2-40B4-BE49-F238E27FC236}">
+                <a16:creationId xmlns:a16="http://schemas.microsoft.com/office/drawing/2014/main" id="{8A1CD9C0-D199-41B4-A0F3-7B6AA4659201}"/>
+              </a:ext>
+            </a:extLst>
+          </p:cNvPr>
+          <p:cNvSpPr txBox="1"/>
+          <p:nvPr/>
+        </p:nvSpPr>
+        <p:spPr>
+          <a:xfrm>
+            <a:off x="9459646" y="4342361"/>
+            <a:ext cx="2618594" cy="2462213"/>
+          </a:xfrm>
+          <a:prstGeom prst="rect">
+            <a:avLst/>
+          </a:prstGeom>
+          <a:noFill/>
+        </p:spPr>
+        <p:txBody>
+          <a:bodyPr wrap="square" rtlCol="0">
+            <a:spAutoFit/>
+          </a:bodyPr>
+          <a:lstStyle/>
+          <a:p>
+            <a:pPr marL="285750" indent="-285750">
+              <a:buFont typeface="Arial" panose="020B0604020202020204" pitchFamily="34" charset="0"/>
+              <a:buChar char="•"/>
+              <a:defRPr/>
+            </a:pPr>
+            <a:r>
+              <a:rPr lang="en-CA" sz="1400" dirty="0"/>
+              <a:t>TSLA has EBITDA margin around 14% and revenue YoY of 15%, serving as an industry leader</a:t>
+            </a:r>
+          </a:p>
+          <a:p>
+            <a:pPr marL="285750" indent="-285750">
+              <a:buFont typeface="Arial" panose="020B0604020202020204" pitchFamily="34" charset="0"/>
+              <a:buChar char="•"/>
+              <a:defRPr/>
+            </a:pPr>
+            <a:r>
+              <a:rPr lang="en-CA" sz="1400" dirty="0"/>
+              <a:t>Compared to industry median of 9.5% EBITDA Margin and -13.5% 1-year Revenues Growth, TSLA becomes competitive and first tier candidate</a:t>
+            </a:r>
+          </a:p>
+          <a:p>
+            <a:pPr marL="285750" indent="-285750">
+              <a:buFont typeface="Arial" panose="020B0604020202020204" pitchFamily="34" charset="0"/>
+              <a:buChar char="•"/>
+              <a:defRPr/>
+            </a:pPr>
+            <a:endParaRPr lang="en-CA" sz="1400" dirty="0"/>
+          </a:p>
+        </p:txBody>
+      </p:sp>
+      <p:sp>
+        <p:nvSpPr>
+          <p:cNvPr id="20" name="矩形 19">
+            <a:extLst>
+              <a:ext uri="{FF2B5EF4-FFF2-40B4-BE49-F238E27FC236}">
+                <a16:creationId xmlns:a16="http://schemas.microsoft.com/office/drawing/2014/main" id="{0C310D50-89BE-456D-B94D-445C19B37BC3}"/>
+              </a:ext>
+            </a:extLst>
+          </p:cNvPr>
+          <p:cNvSpPr/>
+          <p:nvPr/>
+        </p:nvSpPr>
+        <p:spPr>
+          <a:xfrm>
+            <a:off x="6505575" y="1771650"/>
+            <a:ext cx="2618594" cy="714375"/>
+          </a:xfrm>
+          <a:prstGeom prst="rect">
+            <a:avLst/>
+          </a:prstGeom>
+          <a:noFill/>
+          <a:ln w="28575">
+            <a:prstDash val="dash"/>
+          </a:ln>
+        </p:spPr>
+        <p:style>
+          <a:lnRef idx="2">
+            <a:schemeClr val="accent1">
+              <a:shade val="50000"/>
+            </a:schemeClr>
+          </a:lnRef>
+          <a:fillRef idx="1">
+            <a:schemeClr val="accent1"/>
+          </a:fillRef>
+          <a:effectRef idx="0">
+            <a:schemeClr val="accent1"/>
+          </a:effectRef>
+          <a:fontRef idx="minor">
+            <a:schemeClr val="lt1"/>
+          </a:fontRef>
+        </p:style>
+        <p:txBody>
+          <a:bodyPr rtlCol="0" anchor="ctr"/>
+          <a:lstStyle/>
+          <a:p>
+            <a:pPr algn="ctr"/>
+            <a:endParaRPr lang="en-CA" dirty="0"/>
+          </a:p>
+        </p:txBody>
+      </p:sp>
+    </p:spTree>
+    <p:extLst>
+      <p:ext uri="{BB962C8B-B14F-4D97-AF65-F5344CB8AC3E}">
+        <p14:creationId xmlns:p14="http://schemas.microsoft.com/office/powerpoint/2010/main" val="2207402881"/>
+      </p:ext>
+    </p:extLst>
+  </p:cSld>
+  <p:clrMapOvr>
+    <a:masterClrMapping/>
+  </p:clrMapOvr>
+</p:sld>
+</file>
+
+<file path=ppt/slides/slide5.xml><?xml version="1.0" encoding="utf-8"?>
+<p:sld xmlns:a="http://schemas.openxmlformats.org/drawingml/2006/main" xmlns:r="http://schemas.openxmlformats.org/officeDocument/2006/relationships" xmlns:p="http://schemas.openxmlformats.org/presentationml/2006/main">
+  <p:cSld>
+    <p:spTree>
+      <p:nvGrpSpPr>
+        <p:cNvPr id="1" name=""/>
+        <p:cNvGrpSpPr/>
+        <p:nvPr/>
+      </p:nvGrpSpPr>
+      <p:grpSpPr>
+        <a:xfrm>
+          <a:off x="0" y="0"/>
+          <a:ext cx="0" cy="0"/>
+          <a:chOff x="0" y="0"/>
+          <a:chExt cx="0" cy="0"/>
+        </a:xfrm>
+      </p:grpSpPr>
+      <p:sp>
+        <p:nvSpPr>
+          <p:cNvPr id="2" name="標題 1">
+            <a:extLst>
+              <a:ext uri="{FF2B5EF4-FFF2-40B4-BE49-F238E27FC236}">
+                <a16:creationId xmlns:a16="http://schemas.microsoft.com/office/drawing/2014/main" id="{C9446F86-451E-40FA-88C7-B9BA2C8DDCDA}"/>
+              </a:ext>
+            </a:extLst>
+          </p:cNvPr>
+          <p:cNvSpPr>
+            <a:spLocks noGrp="1"/>
+          </p:cNvSpPr>
+          <p:nvPr>
+            <p:ph type="title"/>
+          </p:nvPr>
+        </p:nvSpPr>
+        <p:spPr/>
+        <p:txBody>
+          <a:bodyPr>
+            <a:normAutofit/>
+          </a:bodyPr>
+          <a:lstStyle/>
+          <a:p>
+            <a:r>
+              <a:rPr lang="en-CA" altLang="zh-TW" sz="2200" dirty="0">
+                <a:latin typeface="+mj-lt"/>
+              </a:rPr>
+              <a:t>TSLA-Comparable Models</a:t>
+            </a:r>
+            <a:endParaRPr lang="en-CA" sz="2200" dirty="0">
+              <a:latin typeface="+mj-lt"/>
+            </a:endParaRPr>
+          </a:p>
+        </p:txBody>
+      </p:sp>
+      <p:sp>
+        <p:nvSpPr>
+          <p:cNvPr id="6" name="文字方塊 5">
+            <a:extLst>
+              <a:ext uri="{FF2B5EF4-FFF2-40B4-BE49-F238E27FC236}">
+                <a16:creationId xmlns:a16="http://schemas.microsoft.com/office/drawing/2014/main" id="{046C4879-DB76-4C9D-9EBD-A8E62ABEDFFF}"/>
+              </a:ext>
+            </a:extLst>
+          </p:cNvPr>
+          <p:cNvSpPr txBox="1"/>
+          <p:nvPr/>
+        </p:nvSpPr>
+        <p:spPr>
+          <a:xfrm>
+            <a:off x="709656" y="1024493"/>
+            <a:ext cx="5040000" cy="279928"/>
+          </a:xfrm>
+          <a:prstGeom prst="rect">
+            <a:avLst/>
+          </a:prstGeom>
+          <a:solidFill>
+            <a:srgbClr val="BC0000"/>
+          </a:solidFill>
+          <a:ln>
+            <a:noFill/>
+          </a:ln>
+          <a:effectLst>
+            <a:outerShdw blurRad="50800" dist="38100" dir="2700000" algn="tl" rotWithShape="0">
+              <a:prstClr val="black">
+                <a:alpha val="40000"/>
+              </a:prstClr>
+            </a:outerShdw>
+          </a:effectLst>
+        </p:spPr>
+        <p:style>
+          <a:lnRef idx="2">
+            <a:schemeClr val="accent1">
+              <a:shade val="50000"/>
+            </a:schemeClr>
+          </a:lnRef>
+          <a:fillRef idx="1">
+            <a:schemeClr val="accent1"/>
+          </a:fillRef>
+          <a:effectRef idx="0">
+            <a:schemeClr val="accent1"/>
+          </a:effectRef>
+          <a:fontRef idx="minor">
+            <a:schemeClr val="lt1"/>
+          </a:fontRef>
+        </p:style>
+        <p:txBody>
+          <a:bodyPr rtlCol="0" anchor="ctr"/>
+          <a:lstStyle>
+            <a:defPPr>
+              <a:defRPr lang="en-US"/>
+            </a:defPPr>
+            <a:lvl1pPr marR="0" lvl="0" indent="0" algn="ctr" fontAlgn="auto">
+              <a:lnSpc>
+                <a:spcPct val="100000"/>
+              </a:lnSpc>
+              <a:spcBef>
+                <a:spcPts val="0"/>
+              </a:spcBef>
+              <a:spcAft>
+                <a:spcPts val="0"/>
+              </a:spcAft>
+              <a:buClrTx/>
+              <a:buSzTx/>
+              <a:buFontTx/>
+              <a:buNone/>
+              <a:tabLst/>
+              <a:defRPr kumimoji="0" sz="1400" b="1" i="0" u="none" strike="noStrike" cap="none" spc="0" normalizeH="0" baseline="0">
+                <a:ln>
+                  <a:noFill/>
+                </a:ln>
+                <a:solidFill>
+                  <a:prstClr val="white"/>
+                </a:solidFill>
+                <a:effectLst/>
+                <a:uLnTx/>
+                <a:uFillTx/>
+                <a:latin typeface="Arial" panose="020B0604020202020204" pitchFamily="34" charset="0"/>
+                <a:ea typeface="微软雅黑" panose="020B0503020204020204" pitchFamily="34" charset="-122"/>
+              </a:defRPr>
+            </a:lvl1pPr>
+            <a:lvl2pPr>
+              <a:defRPr>
+                <a:solidFill>
+                  <a:schemeClr val="lt1"/>
+                </a:solidFill>
+              </a:defRPr>
+            </a:lvl2pPr>
+            <a:lvl3pPr>
+              <a:defRPr>
+                <a:solidFill>
+                  <a:schemeClr val="lt1"/>
+                </a:solidFill>
+              </a:defRPr>
+            </a:lvl3pPr>
+            <a:lvl4pPr>
+              <a:defRPr>
+                <a:solidFill>
+                  <a:schemeClr val="lt1"/>
+                </a:solidFill>
+              </a:defRPr>
+            </a:lvl4pPr>
+            <a:lvl5pPr>
+              <a:defRPr>
+                <a:solidFill>
+                  <a:schemeClr val="lt1"/>
+                </a:solidFill>
+              </a:defRPr>
+            </a:lvl5pPr>
+            <a:lvl6pPr>
+              <a:defRPr>
+                <a:solidFill>
+                  <a:schemeClr val="lt1"/>
+                </a:solidFill>
+              </a:defRPr>
+            </a:lvl6pPr>
+            <a:lvl7pPr>
+              <a:defRPr>
+                <a:solidFill>
+                  <a:schemeClr val="lt1"/>
+                </a:solidFill>
+              </a:defRPr>
+            </a:lvl7pPr>
+            <a:lvl8pPr>
+              <a:defRPr>
+                <a:solidFill>
+                  <a:schemeClr val="lt1"/>
+                </a:solidFill>
+              </a:defRPr>
+            </a:lvl8pPr>
+            <a:lvl9pPr>
+              <a:defRPr>
+                <a:solidFill>
+                  <a:schemeClr val="lt1"/>
+                </a:solidFill>
+              </a:defRPr>
+            </a:lvl9pPr>
+          </a:lstStyle>
+          <a:p>
+            <a:r>
+              <a:rPr lang="en-CA" altLang="zh-TW" dirty="0">
+                <a:sym typeface="Arial"/>
+              </a:rPr>
+              <a:t>Valuation Highlights  - EV/Revenues LTM is 14.3x </a:t>
+            </a:r>
+            <a:endParaRPr lang="zh-TW" altLang="en-US" dirty="0">
+              <a:sym typeface="Arial"/>
+            </a:endParaRPr>
           </a:p>
         </p:txBody>
       </p:sp>
@@ -3751,7 +5804,7 @@
         <p:spPr>
           <a:xfrm>
             <a:off x="914530" y="6420618"/>
-            <a:ext cx="5209371" cy="395749"/>
+            <a:ext cx="5209371" cy="236603"/>
           </a:xfrm>
           <a:prstGeom prst="rect">
             <a:avLst/>
@@ -3786,22 +5839,11 @@
               <a:t>：</a:t>
             </a:r>
             <a:r>
-              <a:rPr lang="en-CA" altLang="zh-TW" sz="800" dirty="0" err="1">
-                <a:latin typeface="Arial" panose="020B0604020202020204" pitchFamily="34" charset="0"/>
-                <a:cs typeface="Arial" panose="020B0604020202020204" pitchFamily="34" charset="0"/>
-              </a:rPr>
-              <a:t>Factset</a:t>
-            </a:r>
-            <a:r>
               <a:rPr lang="en-CA" altLang="zh-TW" sz="800" dirty="0">
                 <a:latin typeface="Arial" panose="020B0604020202020204" pitchFamily="34" charset="0"/>
                 <a:cs typeface="Arial" panose="020B0604020202020204" pitchFamily="34" charset="0"/>
               </a:rPr>
-              <a:t>, Equity Research Report, FS. Note 1, adjusted EBITDA = EBITDA </a:t>
-            </a:r>
-            <a:r>
-              <a:rPr lang="en-CA" sz="800" dirty="0"/>
-              <a:t>excludes share based payments</a:t>
+              <a:t>FactSet, Equity Research Report, FS</a:t>
             </a:r>
             <a:endParaRPr lang="zh-CN" altLang="en-US" sz="800" dirty="0">
               <a:latin typeface="Arial" panose="020B0604020202020204" pitchFamily="34" charset="0"/>
@@ -3936,16 +5978,782 @@
             <a:fld id="{B7F7B65C-2824-9347-9C05-39D42996E2F4}" type="slidenum">
               <a:rPr lang="fr-FR" smtClean="0"/>
               <a:pPr/>
-              <a:t>3</a:t>
+              <a:t>5</a:t>
             </a:fld>
             <a:endParaRPr lang="fr-FR" dirty="0"/>
+          </a:p>
+        </p:txBody>
+      </p:sp>
+      <p:pic>
+        <p:nvPicPr>
+          <p:cNvPr id="4" name="圖片 3">
+            <a:extLst>
+              <a:ext uri="{FF2B5EF4-FFF2-40B4-BE49-F238E27FC236}">
+                <a16:creationId xmlns:a16="http://schemas.microsoft.com/office/drawing/2014/main" id="{5B0E2C94-B4C4-4AE9-9D11-A9999486008D}"/>
+              </a:ext>
+            </a:extLst>
+          </p:cNvPr>
+          <p:cNvPicPr>
+            <a:picLocks noChangeAspect="1"/>
+          </p:cNvPicPr>
+          <p:nvPr/>
+        </p:nvPicPr>
+        <p:blipFill rotWithShape="1">
+          <a:blip r:embed="rId3"/>
+          <a:srcRect l="9451"/>
+          <a:stretch/>
+        </p:blipFill>
+        <p:spPr>
+          <a:xfrm>
+            <a:off x="709656" y="1418334"/>
+            <a:ext cx="4838828" cy="4970154"/>
+          </a:xfrm>
+          <a:prstGeom prst="rect">
+            <a:avLst/>
+          </a:prstGeom>
+        </p:spPr>
+      </p:pic>
+      <p:pic>
+        <p:nvPicPr>
+          <p:cNvPr id="8" name="圖片 7">
+            <a:extLst>
+              <a:ext uri="{FF2B5EF4-FFF2-40B4-BE49-F238E27FC236}">
+                <a16:creationId xmlns:a16="http://schemas.microsoft.com/office/drawing/2014/main" id="{C70FE51B-824D-4091-A4EF-C52A287D251B}"/>
+              </a:ext>
+            </a:extLst>
+          </p:cNvPr>
+          <p:cNvPicPr>
+            <a:picLocks noChangeAspect="1"/>
+          </p:cNvPicPr>
+          <p:nvPr/>
+        </p:nvPicPr>
+        <p:blipFill>
+          <a:blip r:embed="rId4"/>
+          <a:stretch>
+            <a:fillRect/>
+          </a:stretch>
+        </p:blipFill>
+        <p:spPr>
+          <a:xfrm>
+            <a:off x="6594341" y="1365154"/>
+            <a:ext cx="4838828" cy="5202498"/>
+          </a:xfrm>
+          <a:prstGeom prst="rect">
+            <a:avLst/>
+          </a:prstGeom>
+        </p:spPr>
+      </p:pic>
+      <p:sp>
+        <p:nvSpPr>
+          <p:cNvPr id="11" name="文字方塊 10">
+            <a:extLst>
+              <a:ext uri="{FF2B5EF4-FFF2-40B4-BE49-F238E27FC236}">
+                <a16:creationId xmlns:a16="http://schemas.microsoft.com/office/drawing/2014/main" id="{EADD33A6-AEB8-4BDB-A429-9BFD587F7B73}"/>
+              </a:ext>
+            </a:extLst>
+          </p:cNvPr>
+          <p:cNvSpPr txBox="1"/>
+          <p:nvPr/>
+        </p:nvSpPr>
+        <p:spPr>
+          <a:xfrm>
+            <a:off x="6493805" y="1024493"/>
+            <a:ext cx="5040000" cy="272715"/>
+          </a:xfrm>
+          <a:prstGeom prst="rect">
+            <a:avLst/>
+          </a:prstGeom>
+          <a:solidFill>
+            <a:srgbClr val="BC0000"/>
+          </a:solidFill>
+          <a:ln>
+            <a:noFill/>
+          </a:ln>
+          <a:effectLst>
+            <a:outerShdw blurRad="50800" dist="38100" dir="2700000" algn="tl" rotWithShape="0">
+              <a:prstClr val="black">
+                <a:alpha val="40000"/>
+              </a:prstClr>
+            </a:outerShdw>
+          </a:effectLst>
+        </p:spPr>
+        <p:style>
+          <a:lnRef idx="2">
+            <a:schemeClr val="accent1">
+              <a:shade val="50000"/>
+            </a:schemeClr>
+          </a:lnRef>
+          <a:fillRef idx="1">
+            <a:schemeClr val="accent1"/>
+          </a:fillRef>
+          <a:effectRef idx="0">
+            <a:schemeClr val="accent1"/>
+          </a:effectRef>
+          <a:fontRef idx="minor">
+            <a:schemeClr val="lt1"/>
+          </a:fontRef>
+        </p:style>
+        <p:txBody>
+          <a:bodyPr rtlCol="0" anchor="ctr"/>
+          <a:lstStyle>
+            <a:defPPr>
+              <a:defRPr lang="en-US"/>
+            </a:defPPr>
+            <a:lvl1pPr marR="0" lvl="0" indent="0" algn="ctr" fontAlgn="auto">
+              <a:lnSpc>
+                <a:spcPct val="100000"/>
+              </a:lnSpc>
+              <a:spcBef>
+                <a:spcPts val="0"/>
+              </a:spcBef>
+              <a:spcAft>
+                <a:spcPts val="0"/>
+              </a:spcAft>
+              <a:buClrTx/>
+              <a:buSzTx/>
+              <a:buFontTx/>
+              <a:buNone/>
+              <a:tabLst/>
+              <a:defRPr kumimoji="0" sz="1400" b="1" i="0" u="none" strike="noStrike" cap="none" spc="0" normalizeH="0" baseline="0">
+                <a:ln>
+                  <a:noFill/>
+                </a:ln>
+                <a:solidFill>
+                  <a:prstClr val="white"/>
+                </a:solidFill>
+                <a:effectLst/>
+                <a:uLnTx/>
+                <a:uFillTx/>
+                <a:latin typeface="Arial" panose="020B0604020202020204" pitchFamily="34" charset="0"/>
+                <a:ea typeface="微软雅黑" panose="020B0503020204020204" pitchFamily="34" charset="-122"/>
+              </a:defRPr>
+            </a:lvl1pPr>
+            <a:lvl2pPr>
+              <a:defRPr>
+                <a:solidFill>
+                  <a:schemeClr val="lt1"/>
+                </a:solidFill>
+              </a:defRPr>
+            </a:lvl2pPr>
+            <a:lvl3pPr>
+              <a:defRPr>
+                <a:solidFill>
+                  <a:schemeClr val="lt1"/>
+                </a:solidFill>
+              </a:defRPr>
+            </a:lvl3pPr>
+            <a:lvl4pPr>
+              <a:defRPr>
+                <a:solidFill>
+                  <a:schemeClr val="lt1"/>
+                </a:solidFill>
+              </a:defRPr>
+            </a:lvl4pPr>
+            <a:lvl5pPr>
+              <a:defRPr>
+                <a:solidFill>
+                  <a:schemeClr val="lt1"/>
+                </a:solidFill>
+              </a:defRPr>
+            </a:lvl5pPr>
+            <a:lvl6pPr>
+              <a:defRPr>
+                <a:solidFill>
+                  <a:schemeClr val="lt1"/>
+                </a:solidFill>
+              </a:defRPr>
+            </a:lvl6pPr>
+            <a:lvl7pPr>
+              <a:defRPr>
+                <a:solidFill>
+                  <a:schemeClr val="lt1"/>
+                </a:solidFill>
+              </a:defRPr>
+            </a:lvl7pPr>
+            <a:lvl8pPr>
+              <a:defRPr>
+                <a:solidFill>
+                  <a:schemeClr val="lt1"/>
+                </a:solidFill>
+              </a:defRPr>
+            </a:lvl8pPr>
+            <a:lvl9pPr>
+              <a:defRPr>
+                <a:solidFill>
+                  <a:schemeClr val="lt1"/>
+                </a:solidFill>
+              </a:defRPr>
+            </a:lvl9pPr>
+          </a:lstStyle>
+          <a:p>
+            <a:r>
+              <a:rPr lang="en-CA" altLang="zh-TW" dirty="0">
+                <a:sym typeface="Arial"/>
+              </a:rPr>
+              <a:t>Valuation Highlights  - EV/EBITDA LTM is 90.8x </a:t>
+            </a:r>
+            <a:endParaRPr lang="zh-TW" altLang="en-US" dirty="0">
+              <a:sym typeface="Arial"/>
+            </a:endParaRPr>
+          </a:p>
+        </p:txBody>
+      </p:sp>
+      <p:sp>
+        <p:nvSpPr>
+          <p:cNvPr id="22" name="文字方塊 21">
+            <a:extLst>
+              <a:ext uri="{FF2B5EF4-FFF2-40B4-BE49-F238E27FC236}">
+                <a16:creationId xmlns:a16="http://schemas.microsoft.com/office/drawing/2014/main" id="{6B3A7BA2-064B-45A1-A41C-C19F6800DF24}"/>
+              </a:ext>
+            </a:extLst>
+          </p:cNvPr>
+          <p:cNvSpPr txBox="1"/>
+          <p:nvPr/>
+        </p:nvSpPr>
+        <p:spPr>
+          <a:xfrm>
+            <a:off x="7180585" y="1731513"/>
+            <a:ext cx="2878879" cy="338554"/>
+          </a:xfrm>
+          <a:prstGeom prst="rect">
+            <a:avLst/>
+          </a:prstGeom>
+          <a:noFill/>
+        </p:spPr>
+        <p:txBody>
+          <a:bodyPr wrap="square">
+            <a:spAutoFit/>
+          </a:bodyPr>
+          <a:lstStyle/>
+          <a:p>
+            <a:r>
+              <a:rPr lang="en-CA" sz="1600" dirty="0">
+                <a:solidFill>
+                  <a:srgbClr val="0070C0"/>
+                </a:solidFill>
+                <a:effectLst/>
+              </a:rPr>
+              <a:t>Industry </a:t>
+            </a:r>
+            <a:r>
+              <a:rPr lang="en-US" altLang="zh-TW" sz="1600" dirty="0">
+                <a:solidFill>
+                  <a:srgbClr val="0070C0"/>
+                </a:solidFill>
+                <a:effectLst/>
+              </a:rPr>
+              <a:t>Median:16.6x</a:t>
+            </a:r>
+            <a:endParaRPr lang="en-CA" sz="1600" dirty="0">
+              <a:solidFill>
+                <a:srgbClr val="0070C0"/>
+              </a:solidFill>
+            </a:endParaRPr>
+          </a:p>
+        </p:txBody>
+      </p:sp>
+      <p:sp>
+        <p:nvSpPr>
+          <p:cNvPr id="20" name="文字方塊 19">
+            <a:extLst>
+              <a:ext uri="{FF2B5EF4-FFF2-40B4-BE49-F238E27FC236}">
+                <a16:creationId xmlns:a16="http://schemas.microsoft.com/office/drawing/2014/main" id="{C7CCF70C-B104-4106-B588-1B122D9C6CB1}"/>
+              </a:ext>
+            </a:extLst>
+          </p:cNvPr>
+          <p:cNvSpPr txBox="1"/>
+          <p:nvPr/>
+        </p:nvSpPr>
+        <p:spPr>
+          <a:xfrm>
+            <a:off x="1338148" y="1742664"/>
+            <a:ext cx="2971374" cy="338554"/>
+          </a:xfrm>
+          <a:prstGeom prst="rect">
+            <a:avLst/>
+          </a:prstGeom>
+          <a:noFill/>
+        </p:spPr>
+        <p:txBody>
+          <a:bodyPr wrap="square">
+            <a:spAutoFit/>
+          </a:bodyPr>
+          <a:lstStyle/>
+          <a:p>
+            <a:r>
+              <a:rPr lang="en-CA" sz="1600" dirty="0">
+                <a:solidFill>
+                  <a:srgbClr val="0070C0"/>
+                </a:solidFill>
+                <a:effectLst/>
+              </a:rPr>
+              <a:t>Industry </a:t>
+            </a:r>
+            <a:r>
+              <a:rPr lang="en-US" altLang="zh-TW" sz="1600" dirty="0">
+                <a:solidFill>
+                  <a:srgbClr val="0070C0"/>
+                </a:solidFill>
+                <a:effectLst/>
+              </a:rPr>
+              <a:t>Median:1.2x</a:t>
+            </a:r>
+            <a:endParaRPr lang="en-CA" sz="1600" dirty="0">
+              <a:solidFill>
+                <a:srgbClr val="0070C0"/>
+              </a:solidFill>
+            </a:endParaRPr>
           </a:p>
         </p:txBody>
       </p:sp>
     </p:spTree>
     <p:extLst>
       <p:ext uri="{BB962C8B-B14F-4D97-AF65-F5344CB8AC3E}">
-        <p14:creationId xmlns:p14="http://schemas.microsoft.com/office/powerpoint/2010/main" val="2207402881"/>
+        <p14:creationId xmlns:p14="http://schemas.microsoft.com/office/powerpoint/2010/main" val="2733798899"/>
+      </p:ext>
+    </p:extLst>
+  </p:cSld>
+  <p:clrMapOvr>
+    <a:masterClrMapping/>
+  </p:clrMapOvr>
+</p:sld>
+</file>
+
+<file path=ppt/slides/slide6.xml><?xml version="1.0" encoding="utf-8"?>
+<p:sld xmlns:a="http://schemas.openxmlformats.org/drawingml/2006/main" xmlns:r="http://schemas.openxmlformats.org/officeDocument/2006/relationships" xmlns:p="http://schemas.openxmlformats.org/presentationml/2006/main">
+  <p:cSld>
+    <p:spTree>
+      <p:nvGrpSpPr>
+        <p:cNvPr id="1" name=""/>
+        <p:cNvGrpSpPr/>
+        <p:nvPr/>
+      </p:nvGrpSpPr>
+      <p:grpSpPr>
+        <a:xfrm>
+          <a:off x="0" y="0"/>
+          <a:ext cx="0" cy="0"/>
+          <a:chOff x="0" y="0"/>
+          <a:chExt cx="0" cy="0"/>
+        </a:xfrm>
+      </p:grpSpPr>
+      <p:sp>
+        <p:nvSpPr>
+          <p:cNvPr id="2" name="標題 1">
+            <a:extLst>
+              <a:ext uri="{FF2B5EF4-FFF2-40B4-BE49-F238E27FC236}">
+                <a16:creationId xmlns:a16="http://schemas.microsoft.com/office/drawing/2014/main" id="{C9446F86-451E-40FA-88C7-B9BA2C8DDCDA}"/>
+              </a:ext>
+            </a:extLst>
+          </p:cNvPr>
+          <p:cNvSpPr>
+            <a:spLocks noGrp="1"/>
+          </p:cNvSpPr>
+          <p:nvPr>
+            <p:ph type="title"/>
+          </p:nvPr>
+        </p:nvSpPr>
+        <p:spPr/>
+        <p:txBody>
+          <a:bodyPr>
+            <a:normAutofit/>
+          </a:bodyPr>
+          <a:lstStyle/>
+          <a:p>
+            <a:r>
+              <a:rPr lang="en-CA" altLang="zh-TW" sz="2200" dirty="0">
+                <a:latin typeface="+mj-lt"/>
+              </a:rPr>
+              <a:t>TSLA-Financial Analysis (Prob don’t need this page)</a:t>
+            </a:r>
+            <a:endParaRPr lang="en-CA" sz="2200" dirty="0">
+              <a:latin typeface="+mj-lt"/>
+            </a:endParaRPr>
+          </a:p>
+        </p:txBody>
+      </p:sp>
+      <p:sp>
+        <p:nvSpPr>
+          <p:cNvPr id="6" name="文字方塊 5">
+            <a:extLst>
+              <a:ext uri="{FF2B5EF4-FFF2-40B4-BE49-F238E27FC236}">
+                <a16:creationId xmlns:a16="http://schemas.microsoft.com/office/drawing/2014/main" id="{046C4879-DB76-4C9D-9EBD-A8E62ABEDFFF}"/>
+              </a:ext>
+            </a:extLst>
+          </p:cNvPr>
+          <p:cNvSpPr txBox="1"/>
+          <p:nvPr/>
+        </p:nvSpPr>
+        <p:spPr>
+          <a:xfrm>
+            <a:off x="709656" y="1024493"/>
+            <a:ext cx="7272000" cy="272715"/>
+          </a:xfrm>
+          <a:prstGeom prst="rect">
+            <a:avLst/>
+          </a:prstGeom>
+          <a:solidFill>
+            <a:srgbClr val="BC0000"/>
+          </a:solidFill>
+          <a:ln>
+            <a:noFill/>
+          </a:ln>
+          <a:effectLst>
+            <a:outerShdw blurRad="50800" dist="38100" dir="2700000" algn="tl" rotWithShape="0">
+              <a:prstClr val="black">
+                <a:alpha val="40000"/>
+              </a:prstClr>
+            </a:outerShdw>
+          </a:effectLst>
+        </p:spPr>
+        <p:style>
+          <a:lnRef idx="2">
+            <a:schemeClr val="accent1">
+              <a:shade val="50000"/>
+            </a:schemeClr>
+          </a:lnRef>
+          <a:fillRef idx="1">
+            <a:schemeClr val="accent1"/>
+          </a:fillRef>
+          <a:effectRef idx="0">
+            <a:schemeClr val="accent1"/>
+          </a:effectRef>
+          <a:fontRef idx="minor">
+            <a:schemeClr val="lt1"/>
+          </a:fontRef>
+        </p:style>
+        <p:txBody>
+          <a:bodyPr rtlCol="0" anchor="ctr"/>
+          <a:lstStyle>
+            <a:defPPr>
+              <a:defRPr lang="en-US"/>
+            </a:defPPr>
+            <a:lvl1pPr marR="0" lvl="0" indent="0" algn="ctr" fontAlgn="auto">
+              <a:lnSpc>
+                <a:spcPct val="100000"/>
+              </a:lnSpc>
+              <a:spcBef>
+                <a:spcPts val="0"/>
+              </a:spcBef>
+              <a:spcAft>
+                <a:spcPts val="0"/>
+              </a:spcAft>
+              <a:buClrTx/>
+              <a:buSzTx/>
+              <a:buFontTx/>
+              <a:buNone/>
+              <a:tabLst/>
+              <a:defRPr kumimoji="0" sz="1400" b="1" i="0" u="none" strike="noStrike" cap="none" spc="0" normalizeH="0" baseline="0">
+                <a:ln>
+                  <a:noFill/>
+                </a:ln>
+                <a:solidFill>
+                  <a:prstClr val="white"/>
+                </a:solidFill>
+                <a:effectLst/>
+                <a:uLnTx/>
+                <a:uFillTx/>
+                <a:latin typeface="Arial" panose="020B0604020202020204" pitchFamily="34" charset="0"/>
+                <a:ea typeface="微软雅黑" panose="020B0503020204020204" pitchFamily="34" charset="-122"/>
+              </a:defRPr>
+            </a:lvl1pPr>
+            <a:lvl2pPr>
+              <a:defRPr>
+                <a:solidFill>
+                  <a:schemeClr val="lt1"/>
+                </a:solidFill>
+              </a:defRPr>
+            </a:lvl2pPr>
+            <a:lvl3pPr>
+              <a:defRPr>
+                <a:solidFill>
+                  <a:schemeClr val="lt1"/>
+                </a:solidFill>
+              </a:defRPr>
+            </a:lvl3pPr>
+            <a:lvl4pPr>
+              <a:defRPr>
+                <a:solidFill>
+                  <a:schemeClr val="lt1"/>
+                </a:solidFill>
+              </a:defRPr>
+            </a:lvl4pPr>
+            <a:lvl5pPr>
+              <a:defRPr>
+                <a:solidFill>
+                  <a:schemeClr val="lt1"/>
+                </a:solidFill>
+              </a:defRPr>
+            </a:lvl5pPr>
+            <a:lvl6pPr>
+              <a:defRPr>
+                <a:solidFill>
+                  <a:schemeClr val="lt1"/>
+                </a:solidFill>
+              </a:defRPr>
+            </a:lvl6pPr>
+            <a:lvl7pPr>
+              <a:defRPr>
+                <a:solidFill>
+                  <a:schemeClr val="lt1"/>
+                </a:solidFill>
+              </a:defRPr>
+            </a:lvl7pPr>
+            <a:lvl8pPr>
+              <a:defRPr>
+                <a:solidFill>
+                  <a:schemeClr val="lt1"/>
+                </a:solidFill>
+              </a:defRPr>
+            </a:lvl8pPr>
+            <a:lvl9pPr>
+              <a:defRPr>
+                <a:solidFill>
+                  <a:schemeClr val="lt1"/>
+                </a:solidFill>
+              </a:defRPr>
+            </a:lvl9pPr>
+          </a:lstStyle>
+          <a:p>
+            <a:r>
+              <a:rPr lang="en-US" altLang="zh-CN" dirty="0"/>
+              <a:t>Revenue breakdown by region</a:t>
+            </a:r>
+          </a:p>
+        </p:txBody>
+      </p:sp>
+      <p:sp>
+        <p:nvSpPr>
+          <p:cNvPr id="12" name="文本框 90">
+            <a:extLst>
+              <a:ext uri="{FF2B5EF4-FFF2-40B4-BE49-F238E27FC236}">
+                <a16:creationId xmlns:a16="http://schemas.microsoft.com/office/drawing/2014/main" id="{8803F9D3-57BD-4F87-9B87-0C5D590B7B31}"/>
+              </a:ext>
+            </a:extLst>
+          </p:cNvPr>
+          <p:cNvSpPr txBox="1"/>
+          <p:nvPr/>
+        </p:nvSpPr>
+        <p:spPr>
+          <a:xfrm>
+            <a:off x="914530" y="6420618"/>
+            <a:ext cx="5209371" cy="395749"/>
+          </a:xfrm>
+          <a:prstGeom prst="rect">
+            <a:avLst/>
+          </a:prstGeom>
+        </p:spPr>
+        <p:txBody>
+          <a:bodyPr wrap="square" rtlCol="0">
+            <a:spAutoFit/>
+          </a:bodyPr>
+          <a:lstStyle/>
+          <a:p>
+            <a:pPr>
+              <a:lnSpc>
+                <a:spcPct val="130000"/>
+              </a:lnSpc>
+              <a:spcBef>
+                <a:spcPts val="600"/>
+              </a:spcBef>
+            </a:pPr>
+            <a:r>
+              <a:rPr lang="en-US" altLang="zh-TW" sz="800" dirty="0">
+                <a:latin typeface="Arial" panose="020B0604020202020204" pitchFamily="34" charset="0"/>
+                <a:cs typeface="Arial" panose="020B0604020202020204" pitchFamily="34" charset="0"/>
+              </a:rPr>
+              <a:t>Source </a:t>
+            </a:r>
+            <a:r>
+              <a:rPr lang="zh-TW" altLang="en-US" sz="800" dirty="0">
+                <a:latin typeface="Arial" panose="020B0604020202020204" pitchFamily="34" charset="0"/>
+                <a:cs typeface="Arial" panose="020B0604020202020204" pitchFamily="34" charset="0"/>
+              </a:rPr>
+              <a:t>：</a:t>
+            </a:r>
+            <a:r>
+              <a:rPr lang="en-CA" altLang="zh-TW" sz="800" dirty="0">
+                <a:latin typeface="Arial" panose="020B0604020202020204" pitchFamily="34" charset="0"/>
+                <a:cs typeface="Arial" panose="020B0604020202020204" pitchFamily="34" charset="0"/>
+              </a:rPr>
+              <a:t>FactSet, Equity Research Report, FS. Note 1, adjusted EBITDA = EBITDA </a:t>
+            </a:r>
+            <a:r>
+              <a:rPr lang="en-CA" sz="800" dirty="0"/>
+              <a:t>excludes share based payments</a:t>
+            </a:r>
+            <a:endParaRPr lang="zh-CN" altLang="en-US" sz="800" dirty="0">
+              <a:latin typeface="Arial" panose="020B0604020202020204" pitchFamily="34" charset="0"/>
+              <a:cs typeface="Arial" panose="020B0604020202020204" pitchFamily="34" charset="0"/>
+            </a:endParaRPr>
+          </a:p>
+        </p:txBody>
+      </p:sp>
+      <p:sp>
+        <p:nvSpPr>
+          <p:cNvPr id="31" name="投影片編號版面配置區 3">
+            <a:extLst>
+              <a:ext uri="{FF2B5EF4-FFF2-40B4-BE49-F238E27FC236}">
+                <a16:creationId xmlns:a16="http://schemas.microsoft.com/office/drawing/2014/main" id="{C8391994-E840-45DD-9B76-C71BE2D0869D}"/>
+              </a:ext>
+            </a:extLst>
+          </p:cNvPr>
+          <p:cNvSpPr txBox="1">
+            <a:spLocks/>
+          </p:cNvSpPr>
+          <p:nvPr/>
+        </p:nvSpPr>
+        <p:spPr>
+          <a:xfrm>
+            <a:off x="524656" y="6356358"/>
+            <a:ext cx="2743200" cy="365125"/>
+          </a:xfrm>
+          <a:prstGeom prst="rect">
+            <a:avLst/>
+          </a:prstGeom>
+        </p:spPr>
+        <p:txBody>
+          <a:bodyPr vert="horz" lIns="91440" tIns="45720" rIns="91440" bIns="45720" rtlCol="0" anchor="ctr"/>
+          <a:lstStyle>
+            <a:defPPr>
+              <a:defRPr lang="en-US"/>
+            </a:defPPr>
+            <a:lvl1pPr marL="0" algn="l" defTabSz="914400" rtl="0" eaLnBrk="1" latinLnBrk="0" hangingPunct="1">
+              <a:defRPr sz="1000" b="0" i="0" kern="1200">
+                <a:solidFill>
+                  <a:schemeClr val="tx1">
+                    <a:tint val="75000"/>
+                  </a:schemeClr>
+                </a:solidFill>
+                <a:latin typeface="Microsoft YaHei" charset="-122"/>
+                <a:ea typeface="Microsoft YaHei" charset="-122"/>
+                <a:cs typeface="Microsoft YaHei" charset="-122"/>
+              </a:defRPr>
+            </a:lvl1pPr>
+            <a:lvl2pPr marL="457200" algn="l" defTabSz="914400" rtl="0" eaLnBrk="1" latinLnBrk="0" hangingPunct="1">
+              <a:defRPr sz="1800" kern="1200">
+                <a:solidFill>
+                  <a:schemeClr val="tx1"/>
+                </a:solidFill>
+                <a:latin typeface="+mn-lt"/>
+                <a:ea typeface="+mn-ea"/>
+                <a:cs typeface="+mn-cs"/>
+              </a:defRPr>
+            </a:lvl2pPr>
+            <a:lvl3pPr marL="914400" algn="l" defTabSz="914400" rtl="0" eaLnBrk="1" latinLnBrk="0" hangingPunct="1">
+              <a:defRPr sz="1800" kern="1200">
+                <a:solidFill>
+                  <a:schemeClr val="tx1"/>
+                </a:solidFill>
+                <a:latin typeface="+mn-lt"/>
+                <a:ea typeface="+mn-ea"/>
+                <a:cs typeface="+mn-cs"/>
+              </a:defRPr>
+            </a:lvl3pPr>
+            <a:lvl4pPr marL="1371600" algn="l" defTabSz="914400" rtl="0" eaLnBrk="1" latinLnBrk="0" hangingPunct="1">
+              <a:defRPr sz="1800" kern="1200">
+                <a:solidFill>
+                  <a:schemeClr val="tx1"/>
+                </a:solidFill>
+                <a:latin typeface="+mn-lt"/>
+                <a:ea typeface="+mn-ea"/>
+                <a:cs typeface="+mn-cs"/>
+              </a:defRPr>
+            </a:lvl4pPr>
+            <a:lvl5pPr marL="1828800" algn="l" defTabSz="914400" rtl="0" eaLnBrk="1" latinLnBrk="0" hangingPunct="1">
+              <a:defRPr sz="1800" kern="1200">
+                <a:solidFill>
+                  <a:schemeClr val="tx1"/>
+                </a:solidFill>
+                <a:latin typeface="+mn-lt"/>
+                <a:ea typeface="+mn-ea"/>
+                <a:cs typeface="+mn-cs"/>
+              </a:defRPr>
+            </a:lvl5pPr>
+            <a:lvl6pPr marL="2286000" algn="l" defTabSz="914400" rtl="0" eaLnBrk="1" latinLnBrk="0" hangingPunct="1">
+              <a:defRPr sz="1800" kern="1200">
+                <a:solidFill>
+                  <a:schemeClr val="tx1"/>
+                </a:solidFill>
+                <a:latin typeface="+mn-lt"/>
+                <a:ea typeface="+mn-ea"/>
+                <a:cs typeface="+mn-cs"/>
+              </a:defRPr>
+            </a:lvl6pPr>
+            <a:lvl7pPr marL="2743200" algn="l" defTabSz="914400" rtl="0" eaLnBrk="1" latinLnBrk="0" hangingPunct="1">
+              <a:defRPr sz="1800" kern="1200">
+                <a:solidFill>
+                  <a:schemeClr val="tx1"/>
+                </a:solidFill>
+                <a:latin typeface="+mn-lt"/>
+                <a:ea typeface="+mn-ea"/>
+                <a:cs typeface="+mn-cs"/>
+              </a:defRPr>
+            </a:lvl7pPr>
+            <a:lvl8pPr marL="3200400" algn="l" defTabSz="914400" rtl="0" eaLnBrk="1" latinLnBrk="0" hangingPunct="1">
+              <a:defRPr sz="1800" kern="1200">
+                <a:solidFill>
+                  <a:schemeClr val="tx1"/>
+                </a:solidFill>
+                <a:latin typeface="+mn-lt"/>
+                <a:ea typeface="+mn-ea"/>
+                <a:cs typeface="+mn-cs"/>
+              </a:defRPr>
+            </a:lvl8pPr>
+            <a:lvl9pPr marL="3657600" algn="l" defTabSz="914400" rtl="0" eaLnBrk="1" latinLnBrk="0" hangingPunct="1">
+              <a:defRPr sz="1800" kern="1200">
+                <a:solidFill>
+                  <a:schemeClr val="tx1"/>
+                </a:solidFill>
+                <a:latin typeface="+mn-lt"/>
+                <a:ea typeface="+mn-ea"/>
+                <a:cs typeface="+mn-cs"/>
+              </a:defRPr>
+            </a:lvl9pPr>
+          </a:lstStyle>
+          <a:p>
+            <a:fld id="{B7F7B65C-2824-9347-9C05-39D42996E2F4}" type="slidenum">
+              <a:rPr lang="fr-FR" smtClean="0"/>
+              <a:pPr/>
+              <a:t>6</a:t>
+            </a:fld>
+            <a:endParaRPr lang="fr-FR" dirty="0"/>
+          </a:p>
+        </p:txBody>
+      </p:sp>
+      <p:pic>
+        <p:nvPicPr>
+          <p:cNvPr id="5" name="圖片 4">
+            <a:extLst>
+              <a:ext uri="{FF2B5EF4-FFF2-40B4-BE49-F238E27FC236}">
+                <a16:creationId xmlns:a16="http://schemas.microsoft.com/office/drawing/2014/main" id="{94458D14-7DEA-4A68-A0C4-5957F82F532A}"/>
+              </a:ext>
+            </a:extLst>
+          </p:cNvPr>
+          <p:cNvPicPr>
+            <a:picLocks noChangeAspect="1"/>
+          </p:cNvPicPr>
+          <p:nvPr/>
+        </p:nvPicPr>
+        <p:blipFill>
+          <a:blip r:embed="rId3"/>
+          <a:stretch>
+            <a:fillRect/>
+          </a:stretch>
+        </p:blipFill>
+        <p:spPr>
+          <a:xfrm>
+            <a:off x="524656" y="1595021"/>
+            <a:ext cx="7499735" cy="4527783"/>
+          </a:xfrm>
+          <a:prstGeom prst="rect">
+            <a:avLst/>
+          </a:prstGeom>
+        </p:spPr>
+      </p:pic>
+    </p:spTree>
+    <p:extLst>
+      <p:ext uri="{BB962C8B-B14F-4D97-AF65-F5344CB8AC3E}">
+        <p14:creationId xmlns:p14="http://schemas.microsoft.com/office/powerpoint/2010/main" val="951620346"/>
       </p:ext>
     </p:extLst>
   </p:cSld>

</xml_diff>

<commit_message>
change graphs for competitors
</commit_message>
<xml_diff>
--- a/Slide_Template/TSLA Financial deck.pptx
+++ b/Slide_Template/TSLA Financial deck.pptx
@@ -4771,6 +4771,7 @@
           <a:prstGeom prst="rect">
             <a:avLst/>
           </a:prstGeom>
+          <a:noFill/>
         </p:spPr>
         <p:style>
           <a:lnRef idx="2">
@@ -4792,10 +4793,18 @@
           <a:bodyPr rtlCol="0" anchor="ctr"/>
           <a:lstStyle/>
           <a:p>
-            <a:pPr algn="ctr"/>
-            <a:r>
-              <a:rPr lang="en-CA" dirty="0"/>
-              <a:t>Description to be added</a:t>
+            <a:pPr marL="285750" indent="-285750">
+              <a:buFont typeface="Arial" panose="020B0604020202020204" pitchFamily="34" charset="0"/>
+              <a:buChar char="•"/>
+              <a:defRPr/>
+            </a:pPr>
+            <a:r>
+              <a:rPr lang="en-CA" sz="1400" dirty="0">
+                <a:solidFill>
+                  <a:schemeClr val="tx1"/>
+                </a:solidFill>
+              </a:rPr>
+              <a:t>The quick ratio offers a more conservative view of a company’s liquidity or ability to meet its short-term liabilities with its short-term assets</a:t>
             </a:r>
           </a:p>
         </p:txBody>

</xml_diff>